<commit_message>
Update presentation and LS CI code
</commit_message>
<xml_diff>
--- a/Presentations/JSM 2020.pptx
+++ b/Presentations/JSM 2020.pptx
@@ -5,7 +5,7 @@
     <p:sldMasterId id="2147483648" r:id="rId1"/>
   </p:sldMasterIdLst>
   <p:notesMasterIdLst>
-    <p:notesMasterId r:id="rId18"/>
+    <p:notesMasterId r:id="rId22"/>
   </p:notesMasterIdLst>
   <p:sldIdLst>
     <p:sldId id="256" r:id="rId2"/>
@@ -24,6 +24,10 @@
     <p:sldId id="263" r:id="rId15"/>
     <p:sldId id="264" r:id="rId16"/>
     <p:sldId id="273" r:id="rId17"/>
+    <p:sldId id="274" r:id="rId18"/>
+    <p:sldId id="275" r:id="rId19"/>
+    <p:sldId id="276" r:id="rId20"/>
+    <p:sldId id="277" r:id="rId21"/>
   </p:sldIdLst>
   <p:sldSz cx="12192000" cy="6858000"/>
   <p:notesSz cx="6858000" cy="9144000"/>
@@ -224,7 +228,7 @@
           <a:p>
             <a:fld id="{9EA8D123-6CF9-4AE0-B70B-23762727A01D}" type="datetimeFigureOut">
               <a:rPr lang="en-CA" smtClean="0"/>
-              <a:t>2020-05-11</a:t>
+              <a:t>2020-05-12</a:t>
             </a:fld>
             <a:endParaRPr lang="en-CA"/>
           </a:p>
@@ -1200,7 +1204,7 @@
           <a:p>
             <a:fld id="{93FCFB22-32B5-4F91-A4F9-56A84F0F6750}" type="datetimeFigureOut">
               <a:rPr lang="en-CA" smtClean="0"/>
-              <a:t>2020-05-11</a:t>
+              <a:t>2020-05-12</a:t>
             </a:fld>
             <a:endParaRPr lang="en-CA"/>
           </a:p>
@@ -1400,7 +1404,7 @@
           <a:p>
             <a:fld id="{93FCFB22-32B5-4F91-A4F9-56A84F0F6750}" type="datetimeFigureOut">
               <a:rPr lang="en-CA" smtClean="0"/>
-              <a:t>2020-05-11</a:t>
+              <a:t>2020-05-12</a:t>
             </a:fld>
             <a:endParaRPr lang="en-CA"/>
           </a:p>
@@ -1610,7 +1614,7 @@
           <a:p>
             <a:fld id="{93FCFB22-32B5-4F91-A4F9-56A84F0F6750}" type="datetimeFigureOut">
               <a:rPr lang="en-CA" smtClean="0"/>
-              <a:t>2020-05-11</a:t>
+              <a:t>2020-05-12</a:t>
             </a:fld>
             <a:endParaRPr lang="en-CA"/>
           </a:p>
@@ -1832,7 +1836,7 @@
           <a:p>
             <a:fld id="{93FCFB22-32B5-4F91-A4F9-56A84F0F6750}" type="datetimeFigureOut">
               <a:rPr lang="en-CA" smtClean="0"/>
-              <a:t>2020-05-11</a:t>
+              <a:t>2020-05-12</a:t>
             </a:fld>
             <a:endParaRPr lang="en-CA"/>
           </a:p>
@@ -2108,7 +2112,7 @@
           <a:p>
             <a:fld id="{93FCFB22-32B5-4F91-A4F9-56A84F0F6750}" type="datetimeFigureOut">
               <a:rPr lang="en-CA" smtClean="0"/>
-              <a:t>2020-05-11</a:t>
+              <a:t>2020-05-12</a:t>
             </a:fld>
             <a:endParaRPr lang="en-CA"/>
           </a:p>
@@ -2376,7 +2380,7 @@
           <a:p>
             <a:fld id="{93FCFB22-32B5-4F91-A4F9-56A84F0F6750}" type="datetimeFigureOut">
               <a:rPr lang="en-CA" smtClean="0"/>
-              <a:t>2020-05-11</a:t>
+              <a:t>2020-05-12</a:t>
             </a:fld>
             <a:endParaRPr lang="en-CA"/>
           </a:p>
@@ -2791,7 +2795,7 @@
           <a:p>
             <a:fld id="{93FCFB22-32B5-4F91-A4F9-56A84F0F6750}" type="datetimeFigureOut">
               <a:rPr lang="en-CA" smtClean="0"/>
-              <a:t>2020-05-11</a:t>
+              <a:t>2020-05-12</a:t>
             </a:fld>
             <a:endParaRPr lang="en-CA"/>
           </a:p>
@@ -2933,7 +2937,7 @@
           <a:p>
             <a:fld id="{93FCFB22-32B5-4F91-A4F9-56A84F0F6750}" type="datetimeFigureOut">
               <a:rPr lang="en-CA" smtClean="0"/>
-              <a:t>2020-05-11</a:t>
+              <a:t>2020-05-12</a:t>
             </a:fld>
             <a:endParaRPr lang="en-CA"/>
           </a:p>
@@ -3046,7 +3050,7 @@
           <a:p>
             <a:fld id="{93FCFB22-32B5-4F91-A4F9-56A84F0F6750}" type="datetimeFigureOut">
               <a:rPr lang="en-CA" smtClean="0"/>
-              <a:t>2020-05-11</a:t>
+              <a:t>2020-05-12</a:t>
             </a:fld>
             <a:endParaRPr lang="en-CA"/>
           </a:p>
@@ -3359,7 +3363,7 @@
           <a:p>
             <a:fld id="{93FCFB22-32B5-4F91-A4F9-56A84F0F6750}" type="datetimeFigureOut">
               <a:rPr lang="en-CA" smtClean="0"/>
-              <a:t>2020-05-11</a:t>
+              <a:t>2020-05-12</a:t>
             </a:fld>
             <a:endParaRPr lang="en-CA"/>
           </a:p>
@@ -3648,7 +3652,7 @@
           <a:p>
             <a:fld id="{93FCFB22-32B5-4F91-A4F9-56A84F0F6750}" type="datetimeFigureOut">
               <a:rPr lang="en-CA" smtClean="0"/>
-              <a:t>2020-05-11</a:t>
+              <a:t>2020-05-12</a:t>
             </a:fld>
             <a:endParaRPr lang="en-CA"/>
           </a:p>
@@ -3891,7 +3895,7 @@
           <a:p>
             <a:fld id="{93FCFB22-32B5-4F91-A4F9-56A84F0F6750}" type="datetimeFigureOut">
               <a:rPr lang="en-CA" smtClean="0"/>
-              <a:t>2020-05-11</a:t>
+              <a:t>2020-05-12</a:t>
             </a:fld>
             <a:endParaRPr lang="en-CA"/>
           </a:p>
@@ -4473,8 +4477,8 @@
           </p:sp>
         </mc:Fallback>
       </mc:AlternateContent>
-      <mc:AlternateContent xmlns:mc="http://schemas.openxmlformats.org/markup-compatibility/2006">
-        <mc:Choice xmlns:a14="http://schemas.microsoft.com/office/drawing/2010/main" Requires="a14">
+      <mc:AlternateContent xmlns:mc="http://schemas.openxmlformats.org/markup-compatibility/2006" xmlns:a14="http://schemas.microsoft.com/office/drawing/2010/main">
+        <mc:Choice Requires="a14">
           <p:sp>
             <p:nvSpPr>
               <p:cNvPr id="3" name="Content Placeholder 2">
@@ -4691,7 +4695,7 @@
             </p:txBody>
           </p:sp>
         </mc:Choice>
-        <mc:Fallback>
+        <mc:Fallback xmlns="">
           <p:sp>
             <p:nvSpPr>
               <p:cNvPr id="3" name="Content Placeholder 2">
@@ -6409,52 +6413,6 @@
               <a:p>
                 <a:endParaRPr lang="en-CA" dirty="0"/>
               </a:p>
-              <a:p>
-                <a:r>
-                  <a:rPr lang="en-CA" dirty="0"/>
-                  <a:t>Profile out </a:t>
-                </a:r>
-                <a14:m>
-                  <m:oMath xmlns:m="http://schemas.openxmlformats.org/officeDocument/2006/math">
-                    <m:r>
-                      <a:rPr lang="en-CA" i="1">
-                        <a:latin typeface="Cambria Math" panose="02040503050406030204" pitchFamily="18" charset="0"/>
-                      </a:rPr>
-                      <m:t>𝜎</m:t>
-                    </m:r>
-                  </m:oMath>
-                </a14:m>
-                <a:r>
-                  <a:rPr lang="en-CA" dirty="0"/>
-                  <a:t> in the same way as when </a:t>
-                </a:r>
-                <a14:m>
-                  <m:oMath xmlns:m="http://schemas.openxmlformats.org/officeDocument/2006/math">
-                    <m:r>
-                      <a:rPr lang="en-CA" i="1">
-                        <a:latin typeface="Cambria Math" panose="02040503050406030204" pitchFamily="18" charset="0"/>
-                      </a:rPr>
-                      <m:t>𝑝</m:t>
-                    </m:r>
-                    <m:r>
-                      <a:rPr lang="en-CA" i="1">
-                        <a:latin typeface="Cambria Math" panose="02040503050406030204" pitchFamily="18" charset="0"/>
-                      </a:rPr>
-                      <m:t>&lt;</m:t>
-                    </m:r>
-                    <m:r>
-                      <a:rPr lang="en-CA" i="1">
-                        <a:latin typeface="Cambria Math" panose="02040503050406030204" pitchFamily="18" charset="0"/>
-                      </a:rPr>
-                      <m:t>𝑛</m:t>
-                    </m:r>
-                  </m:oMath>
-                </a14:m>
-                <a:endParaRPr lang="en-CA" dirty="0"/>
-              </a:p>
-              <a:p>
-                <a:endParaRPr lang="en-CA" dirty="0"/>
-              </a:p>
             </p:txBody>
           </p:sp>
         </mc:Choice>
@@ -6556,12 +6514,798 @@
           </a:p>
         </p:txBody>
       </p:sp>
+      <mc:AlternateContent xmlns:mc="http://schemas.openxmlformats.org/markup-compatibility/2006">
+        <mc:Choice xmlns:a14="http://schemas.microsoft.com/office/drawing/2010/main" Requires="a14">
+          <p:sp>
+            <p:nvSpPr>
+              <p:cNvPr id="3" name="Content Placeholder 2">
+                <a:extLst>
+                  <a:ext uri="{FF2B5EF4-FFF2-40B4-BE49-F238E27FC236}">
+                    <a16:creationId xmlns:a16="http://schemas.microsoft.com/office/drawing/2014/main" id="{4C1BD629-A908-4221-BD07-B98E42740DEC}"/>
+                  </a:ext>
+                </a:extLst>
+              </p:cNvPr>
+              <p:cNvSpPr>
+                <a:spLocks noGrp="1"/>
+              </p:cNvSpPr>
+              <p:nvPr>
+                <p:ph idx="1"/>
+              </p:nvPr>
+            </p:nvSpPr>
+            <p:spPr/>
+            <p:txBody>
+              <a:bodyPr/>
+              <a:lstStyle/>
+              <a:p>
+                <a:r>
+                  <a:rPr lang="en-CA" dirty="0"/>
+                  <a:t>Choose </a:t>
+                </a:r>
+                <a14:m>
+                  <m:oMath xmlns:m="http://schemas.openxmlformats.org/officeDocument/2006/math">
+                    <m:r>
+                      <a:rPr lang="en-CA" i="1">
+                        <a:latin typeface="Cambria Math" panose="02040503050406030204" pitchFamily="18" charset="0"/>
+                      </a:rPr>
+                      <m:t>𝜆</m:t>
+                    </m:r>
+                  </m:oMath>
+                </a14:m>
+                <a:r>
+                  <a:rPr lang="en-CA" dirty="0"/>
+                  <a:t> by cross validation</a:t>
+                </a:r>
+              </a:p>
+              <a:p>
+                <a:endParaRPr lang="en-CA" dirty="0"/>
+              </a:p>
+              <a:p>
+                <a:r>
+                  <a:rPr lang="en-CA" dirty="0"/>
+                  <a:t>Profile out </a:t>
+                </a:r>
+                <a14:m>
+                  <m:oMath xmlns:m="http://schemas.openxmlformats.org/officeDocument/2006/math">
+                    <m:r>
+                      <a:rPr lang="en-CA" i="1">
+                        <a:latin typeface="Cambria Math" panose="02040503050406030204" pitchFamily="18" charset="0"/>
+                      </a:rPr>
+                      <m:t>𝜎</m:t>
+                    </m:r>
+                  </m:oMath>
+                </a14:m>
+                <a:r>
+                  <a:rPr lang="en-CA" dirty="0"/>
+                  <a:t> in the same way as when </a:t>
+                </a:r>
+                <a14:m>
+                  <m:oMath xmlns:m="http://schemas.openxmlformats.org/officeDocument/2006/math">
+                    <m:r>
+                      <a:rPr lang="en-CA" i="1">
+                        <a:latin typeface="Cambria Math" panose="02040503050406030204" pitchFamily="18" charset="0"/>
+                      </a:rPr>
+                      <m:t>𝑝</m:t>
+                    </m:r>
+                    <m:r>
+                      <a:rPr lang="en-CA" i="1">
+                        <a:latin typeface="Cambria Math" panose="02040503050406030204" pitchFamily="18" charset="0"/>
+                      </a:rPr>
+                      <m:t>&lt;</m:t>
+                    </m:r>
+                    <m:r>
+                      <a:rPr lang="en-CA" i="1">
+                        <a:latin typeface="Cambria Math" panose="02040503050406030204" pitchFamily="18" charset="0"/>
+                      </a:rPr>
+                      <m:t>𝑛</m:t>
+                    </m:r>
+                  </m:oMath>
+                </a14:m>
+                <a:endParaRPr lang="en-CA" dirty="0"/>
+              </a:p>
+              <a:p>
+                <a:endParaRPr lang="en-CA" dirty="0"/>
+              </a:p>
+              <a:p>
+                <a:r>
+                  <a:rPr lang="en-CA" dirty="0"/>
+                  <a:t>Maximize “profile likelihood” numerically</a:t>
+                </a:r>
+              </a:p>
+              <a:p>
+                <a:pPr lvl="1"/>
+                <a:r>
+                  <a:rPr lang="en-CA" dirty="0"/>
+                  <a:t>CV folds are fixed over </a:t>
+                </a:r>
+                <a14:m>
+                  <m:oMath xmlns:m="http://schemas.openxmlformats.org/officeDocument/2006/math">
+                    <m:r>
+                      <a:rPr lang="en-CA" b="0" i="1" smtClean="0">
+                        <a:latin typeface="Cambria Math" panose="02040503050406030204" pitchFamily="18" charset="0"/>
+                      </a:rPr>
+                      <m:t>𝛾</m:t>
+                    </m:r>
+                  </m:oMath>
+                </a14:m>
+                <a:endParaRPr lang="en-CA" dirty="0"/>
+              </a:p>
+              <a:p>
+                <a:pPr lvl="1"/>
+                <a:r>
+                  <a:rPr lang="en-CA" dirty="0"/>
+                  <a:t>Candidate </a:t>
+                </a:r>
+                <a14:m>
+                  <m:oMath xmlns:m="http://schemas.openxmlformats.org/officeDocument/2006/math">
+                    <m:r>
+                      <a:rPr lang="en-CA" b="0" i="1" smtClean="0">
+                        <a:latin typeface="Cambria Math" panose="02040503050406030204" pitchFamily="18" charset="0"/>
+                      </a:rPr>
+                      <m:t>𝜆</m:t>
+                    </m:r>
+                  </m:oMath>
+                </a14:m>
+                <a:r>
+                  <a:rPr lang="en-CA" dirty="0"/>
+                  <a:t> values are fixed over </a:t>
+                </a:r>
+                <a14:m>
+                  <m:oMath xmlns:m="http://schemas.openxmlformats.org/officeDocument/2006/math">
+                    <m:r>
+                      <a:rPr lang="en-CA" b="0" i="1" smtClean="0">
+                        <a:latin typeface="Cambria Math" panose="02040503050406030204" pitchFamily="18" charset="0"/>
+                      </a:rPr>
+                      <m:t>𝛾</m:t>
+                    </m:r>
+                  </m:oMath>
+                </a14:m>
+                <a:endParaRPr lang="en-CA" dirty="0"/>
+              </a:p>
+              <a:p>
+                <a:endParaRPr lang="en-CA" dirty="0"/>
+              </a:p>
+            </p:txBody>
+          </p:sp>
+        </mc:Choice>
+        <mc:Fallback>
+          <p:sp>
+            <p:nvSpPr>
+              <p:cNvPr id="3" name="Content Placeholder 2">
+                <a:extLst>
+                  <a:ext uri="{FF2B5EF4-FFF2-40B4-BE49-F238E27FC236}">
+                    <a16:creationId xmlns:a16="http://schemas.microsoft.com/office/drawing/2014/main" id="{4C1BD629-A908-4221-BD07-B98E42740DEC}"/>
+                  </a:ext>
+                </a:extLst>
+              </p:cNvPr>
+              <p:cNvSpPr>
+                <a:spLocks noGrp="1" noRot="1" noChangeAspect="1" noMove="1" noResize="1" noEditPoints="1" noAdjustHandles="1" noChangeArrowheads="1" noChangeShapeType="1" noTextEdit="1"/>
+              </p:cNvSpPr>
+              <p:nvPr>
+                <p:ph idx="1"/>
+              </p:nvPr>
+            </p:nvSpPr>
+            <p:spPr>
+              <a:blipFill>
+                <a:blip r:embed="rId2"/>
+                <a:stretch>
+                  <a:fillRect l="-1333" t="-2801"/>
+                </a:stretch>
+              </a:blipFill>
+            </p:spPr>
+            <p:txBody>
+              <a:bodyPr/>
+              <a:lstStyle/>
+              <a:p>
+                <a:r>
+                  <a:rPr lang="en-CA">
+                    <a:noFill/>
+                  </a:rPr>
+                  <a:t> </a:t>
+                </a:r>
+              </a:p>
+            </p:txBody>
+          </p:sp>
+        </mc:Fallback>
+      </mc:AlternateContent>
+    </p:spTree>
+    <p:extLst>
+      <p:ext uri="{BB962C8B-B14F-4D97-AF65-F5344CB8AC3E}">
+        <p14:creationId xmlns:p14="http://schemas.microsoft.com/office/powerpoint/2010/main" val="161548433"/>
+      </p:ext>
+    </p:extLst>
+  </p:cSld>
+  <p:clrMapOvr>
+    <a:masterClrMapping/>
+  </p:clrMapOvr>
+</p:sld>
+</file>
+
+<file path=ppt/slides/slide17.xml><?xml version="1.0" encoding="utf-8"?>
+<p:sld xmlns:a="http://schemas.openxmlformats.org/drawingml/2006/main" xmlns:r="http://schemas.openxmlformats.org/officeDocument/2006/relationships" xmlns:p="http://schemas.openxmlformats.org/presentationml/2006/main">
+  <p:cSld>
+    <p:spTree>
+      <p:nvGrpSpPr>
+        <p:cNvPr id="1" name=""/>
+        <p:cNvGrpSpPr/>
+        <p:nvPr/>
+      </p:nvGrpSpPr>
+      <p:grpSpPr>
+        <a:xfrm>
+          <a:off x="0" y="0"/>
+          <a:ext cx="0" cy="0"/>
+          <a:chOff x="0" y="0"/>
+          <a:chExt cx="0" cy="0"/>
+        </a:xfrm>
+      </p:grpSpPr>
+      <p:sp>
+        <p:nvSpPr>
+          <p:cNvPr id="2" name="Title 1">
+            <a:extLst>
+              <a:ext uri="{FF2B5EF4-FFF2-40B4-BE49-F238E27FC236}">
+                <a16:creationId xmlns:a16="http://schemas.microsoft.com/office/drawing/2014/main" id="{39D9A0D3-5786-4684-A2D4-BE44181D4725}"/>
+              </a:ext>
+            </a:extLst>
+          </p:cNvPr>
+          <p:cNvSpPr>
+            <a:spLocks noGrp="1"/>
+          </p:cNvSpPr>
+          <p:nvPr>
+            <p:ph type="title"/>
+          </p:nvPr>
+        </p:nvSpPr>
+        <p:spPr/>
+        <p:txBody>
+          <a:bodyPr/>
+          <a:lstStyle/>
+          <a:p>
+            <a:r>
+              <a:rPr lang="en-CA" dirty="0"/>
+              <a:t>LASSO with Box-Cox</a:t>
+            </a:r>
+          </a:p>
+        </p:txBody>
+      </p:sp>
+      <p:pic>
+        <p:nvPicPr>
+          <p:cNvPr id="19" name="Content Placeholder 18" descr="A picture containing man, water, kite, table&#10;&#10;Description automatically generated">
+            <a:extLst>
+              <a:ext uri="{FF2B5EF4-FFF2-40B4-BE49-F238E27FC236}">
+                <a16:creationId xmlns:a16="http://schemas.microsoft.com/office/drawing/2014/main" id="{5DBD515E-B64B-48E6-B773-C1AF6FB9DF6C}"/>
+              </a:ext>
+            </a:extLst>
+          </p:cNvPr>
+          <p:cNvPicPr>
+            <a:picLocks noGrp="1" noChangeAspect="1"/>
+          </p:cNvPicPr>
+          <p:nvPr>
+            <p:ph idx="1"/>
+          </p:nvPr>
+        </p:nvPicPr>
+        <p:blipFill>
+          <a:blip r:embed="rId2">
+            <a:extLst>
+              <a:ext uri="{28A0092B-C50C-407E-A947-70E740481C1C}">
+                <a14:useLocalDpi xmlns:a14="http://schemas.microsoft.com/office/drawing/2010/main" val="0"/>
+              </a:ext>
+            </a:extLst>
+          </a:blip>
+          <a:stretch>
+            <a:fillRect/>
+          </a:stretch>
+        </p:blipFill>
+        <p:spPr>
+          <a:xfrm>
+            <a:off x="2762040" y="1690688"/>
+            <a:ext cx="6667920" cy="4762800"/>
+          </a:xfrm>
+        </p:spPr>
+      </p:pic>
+      <p:pic>
+        <p:nvPicPr>
+          <p:cNvPr id="30" name="Picture 29" descr="A picture containing man, photo, table, black&#10;&#10;Description automatically generated">
+            <a:extLst>
+              <a:ext uri="{FF2B5EF4-FFF2-40B4-BE49-F238E27FC236}">
+                <a16:creationId xmlns:a16="http://schemas.microsoft.com/office/drawing/2014/main" id="{B3691FEF-E73C-4CBD-B2E7-6C593E1CEA97}"/>
+              </a:ext>
+            </a:extLst>
+          </p:cNvPr>
+          <p:cNvPicPr>
+            <a:picLocks noChangeAspect="1"/>
+          </p:cNvPicPr>
+          <p:nvPr/>
+        </p:nvPicPr>
+        <p:blipFill>
+          <a:blip r:embed="rId3">
+            <a:extLst>
+              <a:ext uri="{28A0092B-C50C-407E-A947-70E740481C1C}">
+                <a14:useLocalDpi xmlns:a14="http://schemas.microsoft.com/office/drawing/2010/main" val="0"/>
+              </a:ext>
+            </a:extLst>
+          </a:blip>
+          <a:stretch>
+            <a:fillRect/>
+          </a:stretch>
+        </p:blipFill>
+        <p:spPr>
+          <a:xfrm>
+            <a:off x="2761529" y="1690323"/>
+            <a:ext cx="6668431" cy="4763165"/>
+          </a:xfrm>
+          <a:prstGeom prst="rect">
+            <a:avLst/>
+          </a:prstGeom>
+        </p:spPr>
+      </p:pic>
+      <p:pic>
+        <p:nvPicPr>
+          <p:cNvPr id="32" name="Picture 31" descr="A picture containing man, photo, table, water&#10;&#10;Description automatically generated">
+            <a:extLst>
+              <a:ext uri="{FF2B5EF4-FFF2-40B4-BE49-F238E27FC236}">
+                <a16:creationId xmlns:a16="http://schemas.microsoft.com/office/drawing/2014/main" id="{E8D515D0-867A-48F6-A0CF-3B866D76BC31}"/>
+              </a:ext>
+            </a:extLst>
+          </p:cNvPr>
+          <p:cNvPicPr>
+            <a:picLocks noChangeAspect="1"/>
+          </p:cNvPicPr>
+          <p:nvPr/>
+        </p:nvPicPr>
+        <p:blipFill>
+          <a:blip r:embed="rId4">
+            <a:extLst>
+              <a:ext uri="{28A0092B-C50C-407E-A947-70E740481C1C}">
+                <a14:useLocalDpi xmlns:a14="http://schemas.microsoft.com/office/drawing/2010/main" val="0"/>
+              </a:ext>
+            </a:extLst>
+          </a:blip>
+          <a:stretch>
+            <a:fillRect/>
+          </a:stretch>
+        </p:blipFill>
+        <p:spPr>
+          <a:xfrm>
+            <a:off x="2761529" y="1690323"/>
+            <a:ext cx="6668431" cy="4763165"/>
+          </a:xfrm>
+          <a:prstGeom prst="rect">
+            <a:avLst/>
+          </a:prstGeom>
+        </p:spPr>
+      </p:pic>
+      <p:pic>
+        <p:nvPicPr>
+          <p:cNvPr id="34" name="Picture 33" descr="A close up of a person&#10;&#10;Description automatically generated">
+            <a:extLst>
+              <a:ext uri="{FF2B5EF4-FFF2-40B4-BE49-F238E27FC236}">
+                <a16:creationId xmlns:a16="http://schemas.microsoft.com/office/drawing/2014/main" id="{F4C5C16F-6F15-4407-A56B-04060B21723A}"/>
+              </a:ext>
+            </a:extLst>
+          </p:cNvPr>
+          <p:cNvPicPr>
+            <a:picLocks noChangeAspect="1"/>
+          </p:cNvPicPr>
+          <p:nvPr/>
+        </p:nvPicPr>
+        <p:blipFill>
+          <a:blip r:embed="rId5">
+            <a:extLst>
+              <a:ext uri="{28A0092B-C50C-407E-A947-70E740481C1C}">
+                <a14:useLocalDpi xmlns:a14="http://schemas.microsoft.com/office/drawing/2010/main" val="0"/>
+              </a:ext>
+            </a:extLst>
+          </a:blip>
+          <a:stretch>
+            <a:fillRect/>
+          </a:stretch>
+        </p:blipFill>
+        <p:spPr>
+          <a:xfrm>
+            <a:off x="2761529" y="1690322"/>
+            <a:ext cx="6668431" cy="4763165"/>
+          </a:xfrm>
+          <a:prstGeom prst="rect">
+            <a:avLst/>
+          </a:prstGeom>
+        </p:spPr>
+      </p:pic>
+      <p:pic>
+        <p:nvPicPr>
+          <p:cNvPr id="36" name="Picture 35" descr="A picture containing photo, man, table, different&#10;&#10;Description automatically generated">
+            <a:extLst>
+              <a:ext uri="{FF2B5EF4-FFF2-40B4-BE49-F238E27FC236}">
+                <a16:creationId xmlns:a16="http://schemas.microsoft.com/office/drawing/2014/main" id="{16DAFDDB-AC25-4E87-AE2D-0DD3337061B1}"/>
+              </a:ext>
+            </a:extLst>
+          </p:cNvPr>
+          <p:cNvPicPr>
+            <a:picLocks noChangeAspect="1"/>
+          </p:cNvPicPr>
+          <p:nvPr/>
+        </p:nvPicPr>
+        <p:blipFill>
+          <a:blip r:embed="rId6">
+            <a:extLst>
+              <a:ext uri="{28A0092B-C50C-407E-A947-70E740481C1C}">
+                <a14:useLocalDpi xmlns:a14="http://schemas.microsoft.com/office/drawing/2010/main" val="0"/>
+              </a:ext>
+            </a:extLst>
+          </a:blip>
+          <a:stretch>
+            <a:fillRect/>
+          </a:stretch>
+        </p:blipFill>
+        <p:spPr>
+          <a:xfrm>
+            <a:off x="2761529" y="1690321"/>
+            <a:ext cx="6668431" cy="4763165"/>
+          </a:xfrm>
+          <a:prstGeom prst="rect">
+            <a:avLst/>
+          </a:prstGeom>
+        </p:spPr>
+      </p:pic>
+    </p:spTree>
+    <p:extLst>
+      <p:ext uri="{BB962C8B-B14F-4D97-AF65-F5344CB8AC3E}">
+        <p14:creationId xmlns:p14="http://schemas.microsoft.com/office/powerpoint/2010/main" val="3307092910"/>
+      </p:ext>
+    </p:extLst>
+  </p:cSld>
+  <p:clrMapOvr>
+    <a:masterClrMapping/>
+  </p:clrMapOvr>
+  <p:timing>
+    <p:tnLst>
+      <p:par>
+        <p:cTn id="1" dur="indefinite" restart="never" nodeType="tmRoot">
+          <p:childTnLst>
+            <p:seq concurrent="1" nextAc="seek">
+              <p:cTn id="2" dur="indefinite" nodeType="mainSeq">
+                <p:childTnLst>
+                  <p:par>
+                    <p:cTn id="3" fill="hold">
+                      <p:stCondLst>
+                        <p:cond delay="indefinite"/>
+                        <p:cond evt="onBegin" delay="0">
+                          <p:tn val="2"/>
+                        </p:cond>
+                      </p:stCondLst>
+                      <p:childTnLst>
+                        <p:par>
+                          <p:cTn id="4" fill="hold">
+                            <p:stCondLst>
+                              <p:cond delay="0"/>
+                            </p:stCondLst>
+                            <p:childTnLst>
+                              <p:par>
+                                <p:cTn id="5" presetID="10" presetClass="entr" presetSubtype="0" fill="hold" nodeType="withEffect">
+                                  <p:stCondLst>
+                                    <p:cond delay="0"/>
+                                  </p:stCondLst>
+                                  <p:childTnLst>
+                                    <p:set>
+                                      <p:cBhvr>
+                                        <p:cTn id="6" dur="1" fill="hold">
+                                          <p:stCondLst>
+                                            <p:cond delay="0"/>
+                                          </p:stCondLst>
+                                        </p:cTn>
+                                        <p:tgtEl>
+                                          <p:spTgt spid="19"/>
+                                        </p:tgtEl>
+                                        <p:attrNameLst>
+                                          <p:attrName>style.visibility</p:attrName>
+                                        </p:attrNameLst>
+                                      </p:cBhvr>
+                                      <p:to>
+                                        <p:strVal val="visible"/>
+                                      </p:to>
+                                    </p:set>
+                                    <p:animEffect transition="in" filter="fade">
+                                      <p:cBhvr>
+                                        <p:cTn id="7" dur="500"/>
+                                        <p:tgtEl>
+                                          <p:spTgt spid="19"/>
+                                        </p:tgtEl>
+                                      </p:cBhvr>
+                                    </p:animEffect>
+                                  </p:childTnLst>
+                                </p:cTn>
+                              </p:par>
+                            </p:childTnLst>
+                          </p:cTn>
+                        </p:par>
+                      </p:childTnLst>
+                    </p:cTn>
+                  </p:par>
+                  <p:par>
+                    <p:cTn id="8" fill="hold">
+                      <p:stCondLst>
+                        <p:cond delay="indefinite"/>
+                      </p:stCondLst>
+                      <p:childTnLst>
+                        <p:par>
+                          <p:cTn id="9" fill="hold">
+                            <p:stCondLst>
+                              <p:cond delay="0"/>
+                            </p:stCondLst>
+                            <p:childTnLst>
+                              <p:par>
+                                <p:cTn id="10" presetID="10" presetClass="entr" presetSubtype="0" fill="hold" nodeType="clickEffect">
+                                  <p:stCondLst>
+                                    <p:cond delay="0"/>
+                                  </p:stCondLst>
+                                  <p:childTnLst>
+                                    <p:set>
+                                      <p:cBhvr>
+                                        <p:cTn id="11" dur="1" fill="hold">
+                                          <p:stCondLst>
+                                            <p:cond delay="0"/>
+                                          </p:stCondLst>
+                                        </p:cTn>
+                                        <p:tgtEl>
+                                          <p:spTgt spid="30"/>
+                                        </p:tgtEl>
+                                        <p:attrNameLst>
+                                          <p:attrName>style.visibility</p:attrName>
+                                        </p:attrNameLst>
+                                      </p:cBhvr>
+                                      <p:to>
+                                        <p:strVal val="visible"/>
+                                      </p:to>
+                                    </p:set>
+                                    <p:animEffect transition="in" filter="fade">
+                                      <p:cBhvr>
+                                        <p:cTn id="12" dur="500"/>
+                                        <p:tgtEl>
+                                          <p:spTgt spid="30"/>
+                                        </p:tgtEl>
+                                      </p:cBhvr>
+                                    </p:animEffect>
+                                  </p:childTnLst>
+                                </p:cTn>
+                              </p:par>
+                            </p:childTnLst>
+                          </p:cTn>
+                        </p:par>
+                      </p:childTnLst>
+                    </p:cTn>
+                  </p:par>
+                  <p:par>
+                    <p:cTn id="13" fill="hold">
+                      <p:stCondLst>
+                        <p:cond delay="indefinite"/>
+                      </p:stCondLst>
+                      <p:childTnLst>
+                        <p:par>
+                          <p:cTn id="14" fill="hold">
+                            <p:stCondLst>
+                              <p:cond delay="0"/>
+                            </p:stCondLst>
+                            <p:childTnLst>
+                              <p:par>
+                                <p:cTn id="15" presetID="10" presetClass="entr" presetSubtype="0" fill="hold" nodeType="clickEffect">
+                                  <p:stCondLst>
+                                    <p:cond delay="0"/>
+                                  </p:stCondLst>
+                                  <p:childTnLst>
+                                    <p:set>
+                                      <p:cBhvr>
+                                        <p:cTn id="16" dur="1" fill="hold">
+                                          <p:stCondLst>
+                                            <p:cond delay="0"/>
+                                          </p:stCondLst>
+                                        </p:cTn>
+                                        <p:tgtEl>
+                                          <p:spTgt spid="32"/>
+                                        </p:tgtEl>
+                                        <p:attrNameLst>
+                                          <p:attrName>style.visibility</p:attrName>
+                                        </p:attrNameLst>
+                                      </p:cBhvr>
+                                      <p:to>
+                                        <p:strVal val="visible"/>
+                                      </p:to>
+                                    </p:set>
+                                    <p:animEffect transition="in" filter="fade">
+                                      <p:cBhvr>
+                                        <p:cTn id="17" dur="500"/>
+                                        <p:tgtEl>
+                                          <p:spTgt spid="32"/>
+                                        </p:tgtEl>
+                                      </p:cBhvr>
+                                    </p:animEffect>
+                                  </p:childTnLst>
+                                </p:cTn>
+                              </p:par>
+                            </p:childTnLst>
+                          </p:cTn>
+                        </p:par>
+                      </p:childTnLst>
+                    </p:cTn>
+                  </p:par>
+                  <p:par>
+                    <p:cTn id="18" fill="hold">
+                      <p:stCondLst>
+                        <p:cond delay="indefinite"/>
+                      </p:stCondLst>
+                      <p:childTnLst>
+                        <p:par>
+                          <p:cTn id="19" fill="hold">
+                            <p:stCondLst>
+                              <p:cond delay="0"/>
+                            </p:stCondLst>
+                            <p:childTnLst>
+                              <p:par>
+                                <p:cTn id="20" presetID="10" presetClass="entr" presetSubtype="0" fill="hold" nodeType="clickEffect">
+                                  <p:stCondLst>
+                                    <p:cond delay="0"/>
+                                  </p:stCondLst>
+                                  <p:childTnLst>
+                                    <p:set>
+                                      <p:cBhvr>
+                                        <p:cTn id="21" dur="1" fill="hold">
+                                          <p:stCondLst>
+                                            <p:cond delay="0"/>
+                                          </p:stCondLst>
+                                        </p:cTn>
+                                        <p:tgtEl>
+                                          <p:spTgt spid="34"/>
+                                        </p:tgtEl>
+                                        <p:attrNameLst>
+                                          <p:attrName>style.visibility</p:attrName>
+                                        </p:attrNameLst>
+                                      </p:cBhvr>
+                                      <p:to>
+                                        <p:strVal val="visible"/>
+                                      </p:to>
+                                    </p:set>
+                                    <p:animEffect transition="in" filter="fade">
+                                      <p:cBhvr>
+                                        <p:cTn id="22" dur="500"/>
+                                        <p:tgtEl>
+                                          <p:spTgt spid="34"/>
+                                        </p:tgtEl>
+                                      </p:cBhvr>
+                                    </p:animEffect>
+                                  </p:childTnLst>
+                                </p:cTn>
+                              </p:par>
+                            </p:childTnLst>
+                          </p:cTn>
+                        </p:par>
+                      </p:childTnLst>
+                    </p:cTn>
+                  </p:par>
+                  <p:par>
+                    <p:cTn id="23" fill="hold">
+                      <p:stCondLst>
+                        <p:cond delay="indefinite"/>
+                      </p:stCondLst>
+                      <p:childTnLst>
+                        <p:par>
+                          <p:cTn id="24" fill="hold">
+                            <p:stCondLst>
+                              <p:cond delay="0"/>
+                            </p:stCondLst>
+                            <p:childTnLst>
+                              <p:par>
+                                <p:cTn id="25" presetID="10" presetClass="entr" presetSubtype="0" fill="hold" nodeType="clickEffect">
+                                  <p:stCondLst>
+                                    <p:cond delay="0"/>
+                                  </p:stCondLst>
+                                  <p:childTnLst>
+                                    <p:set>
+                                      <p:cBhvr>
+                                        <p:cTn id="26" dur="1" fill="hold">
+                                          <p:stCondLst>
+                                            <p:cond delay="0"/>
+                                          </p:stCondLst>
+                                        </p:cTn>
+                                        <p:tgtEl>
+                                          <p:spTgt spid="36"/>
+                                        </p:tgtEl>
+                                        <p:attrNameLst>
+                                          <p:attrName>style.visibility</p:attrName>
+                                        </p:attrNameLst>
+                                      </p:cBhvr>
+                                      <p:to>
+                                        <p:strVal val="visible"/>
+                                      </p:to>
+                                    </p:set>
+                                    <p:animEffect transition="in" filter="fade">
+                                      <p:cBhvr>
+                                        <p:cTn id="27" dur="500"/>
+                                        <p:tgtEl>
+                                          <p:spTgt spid="36"/>
+                                        </p:tgtEl>
+                                      </p:cBhvr>
+                                    </p:animEffect>
+                                  </p:childTnLst>
+                                </p:cTn>
+                              </p:par>
+                            </p:childTnLst>
+                          </p:cTn>
+                        </p:par>
+                      </p:childTnLst>
+                    </p:cTn>
+                  </p:par>
+                </p:childTnLst>
+              </p:cTn>
+              <p:prevCondLst>
+                <p:cond evt="onPrev" delay="0">
+                  <p:tgtEl>
+                    <p:sldTgt/>
+                  </p:tgtEl>
+                </p:cond>
+              </p:prevCondLst>
+              <p:nextCondLst>
+                <p:cond evt="onNext" delay="0">
+                  <p:tgtEl>
+                    <p:sldTgt/>
+                  </p:tgtEl>
+                </p:cond>
+              </p:nextCondLst>
+            </p:seq>
+          </p:childTnLst>
+        </p:cTn>
+      </p:par>
+    </p:tnLst>
+  </p:timing>
+</p:sld>
+</file>
+
+<file path=ppt/slides/slide18.xml><?xml version="1.0" encoding="utf-8"?>
+<p:sld xmlns:a="http://schemas.openxmlformats.org/drawingml/2006/main" xmlns:r="http://schemas.openxmlformats.org/officeDocument/2006/relationships" xmlns:p="http://schemas.openxmlformats.org/presentationml/2006/main">
+  <p:cSld>
+    <p:spTree>
+      <p:nvGrpSpPr>
+        <p:cNvPr id="1" name=""/>
+        <p:cNvGrpSpPr/>
+        <p:nvPr/>
+      </p:nvGrpSpPr>
+      <p:grpSpPr>
+        <a:xfrm>
+          <a:off x="0" y="0"/>
+          <a:ext cx="0" cy="0"/>
+          <a:chOff x="0" y="0"/>
+          <a:chExt cx="0" cy="0"/>
+        </a:xfrm>
+      </p:grpSpPr>
+      <p:sp>
+        <p:nvSpPr>
+          <p:cNvPr id="2" name="Title 1">
+            <a:extLst>
+              <a:ext uri="{FF2B5EF4-FFF2-40B4-BE49-F238E27FC236}">
+                <a16:creationId xmlns:a16="http://schemas.microsoft.com/office/drawing/2014/main" id="{B7B876A9-BC99-45F1-B1CE-BB5A45B5404B}"/>
+              </a:ext>
+            </a:extLst>
+          </p:cNvPr>
+          <p:cNvSpPr>
+            <a:spLocks noGrp="1"/>
+          </p:cNvSpPr>
+          <p:nvPr>
+            <p:ph type="title"/>
+          </p:nvPr>
+        </p:nvSpPr>
+        <p:spPr/>
+        <p:txBody>
+          <a:bodyPr/>
+          <a:lstStyle/>
+          <a:p>
+            <a:r>
+              <a:rPr lang="en-CA" dirty="0"/>
+              <a:t>Box-Cox Inference</a:t>
+            </a:r>
+          </a:p>
+        </p:txBody>
+      </p:sp>
       <p:sp>
         <p:nvSpPr>
           <p:cNvPr id="3" name="Content Placeholder 2">
             <a:extLst>
               <a:ext uri="{FF2B5EF4-FFF2-40B4-BE49-F238E27FC236}">
-                <a16:creationId xmlns:a16="http://schemas.microsoft.com/office/drawing/2014/main" id="{4C1BD629-A908-4221-BD07-B98E42740DEC}"/>
+                <a16:creationId xmlns:a16="http://schemas.microsoft.com/office/drawing/2014/main" id="{22E89C37-6632-46B8-B168-AC12BD1B9B49}"/>
               </a:ext>
             </a:extLst>
           </p:cNvPr>
@@ -6577,14 +7321,716 @@
           <a:bodyPr/>
           <a:lstStyle/>
           <a:p>
-            <a:endParaRPr lang="en-CA"/>
+            <a:r>
+              <a:rPr lang="en-CA" dirty="0"/>
+              <a:t>LS Box-Cox methodology gives confidence intervals</a:t>
+            </a:r>
+          </a:p>
+          <a:p>
+            <a:endParaRPr lang="en-CA" dirty="0"/>
+          </a:p>
+          <a:p>
+            <a:r>
+              <a:rPr lang="en-CA" dirty="0"/>
+              <a:t>We can apply the same process with LASSO</a:t>
+            </a:r>
+          </a:p>
+          <a:p>
+            <a:endParaRPr lang="en-CA" dirty="0"/>
+          </a:p>
+          <a:p>
+            <a:r>
+              <a:rPr lang="en-CA" dirty="0"/>
+              <a:t>Still a work in progress</a:t>
+            </a:r>
+          </a:p>
+          <a:p>
+            <a:r>
+              <a:rPr lang="en-CA" dirty="0"/>
+              <a:t>Some empirical results</a:t>
+            </a:r>
           </a:p>
         </p:txBody>
       </p:sp>
     </p:spTree>
     <p:extLst>
       <p:ext uri="{BB962C8B-B14F-4D97-AF65-F5344CB8AC3E}">
-        <p14:creationId xmlns:p14="http://schemas.microsoft.com/office/powerpoint/2010/main" val="161548433"/>
+        <p14:creationId xmlns:p14="http://schemas.microsoft.com/office/powerpoint/2010/main" val="3342363398"/>
+      </p:ext>
+    </p:extLst>
+  </p:cSld>
+  <p:clrMapOvr>
+    <a:masterClrMapping/>
+  </p:clrMapOvr>
+</p:sld>
+</file>
+
+<file path=ppt/slides/slide19.xml><?xml version="1.0" encoding="utf-8"?>
+<p:sld xmlns:a="http://schemas.openxmlformats.org/drawingml/2006/main" xmlns:r="http://schemas.openxmlformats.org/officeDocument/2006/relationships" xmlns:p="http://schemas.openxmlformats.org/presentationml/2006/main">
+  <p:cSld>
+    <p:spTree>
+      <p:nvGrpSpPr>
+        <p:cNvPr id="1" name=""/>
+        <p:cNvGrpSpPr/>
+        <p:nvPr/>
+      </p:nvGrpSpPr>
+      <p:grpSpPr>
+        <a:xfrm>
+          <a:off x="0" y="0"/>
+          <a:ext cx="0" cy="0"/>
+          <a:chOff x="0" y="0"/>
+          <a:chExt cx="0" cy="0"/>
+        </a:xfrm>
+      </p:grpSpPr>
+      <p:sp>
+        <p:nvSpPr>
+          <p:cNvPr id="2" name="Title 1">
+            <a:extLst>
+              <a:ext uri="{FF2B5EF4-FFF2-40B4-BE49-F238E27FC236}">
+                <a16:creationId xmlns:a16="http://schemas.microsoft.com/office/drawing/2014/main" id="{4F79089B-F368-4CC7-BB7D-6AB24A7F0A10}"/>
+              </a:ext>
+            </a:extLst>
+          </p:cNvPr>
+          <p:cNvSpPr>
+            <a:spLocks noGrp="1"/>
+          </p:cNvSpPr>
+          <p:nvPr>
+            <p:ph type="title"/>
+          </p:nvPr>
+        </p:nvSpPr>
+        <p:spPr/>
+        <p:txBody>
+          <a:bodyPr/>
+          <a:lstStyle/>
+          <a:p>
+            <a:r>
+              <a:rPr lang="en-CA" dirty="0"/>
+              <a:t>Box-Cox Inference</a:t>
+            </a:r>
+          </a:p>
+        </p:txBody>
+      </p:sp>
+      <mc:AlternateContent xmlns:mc="http://schemas.openxmlformats.org/markup-compatibility/2006">
+        <mc:Choice xmlns:a14="http://schemas.microsoft.com/office/drawing/2010/main" Requires="a14">
+          <p:sp>
+            <p:nvSpPr>
+              <p:cNvPr id="3" name="Content Placeholder 2">
+                <a:extLst>
+                  <a:ext uri="{FF2B5EF4-FFF2-40B4-BE49-F238E27FC236}">
+                    <a16:creationId xmlns:a16="http://schemas.microsoft.com/office/drawing/2014/main" id="{899A185B-0966-4635-B23D-062B4F969B65}"/>
+                  </a:ext>
+                </a:extLst>
+              </p:cNvPr>
+              <p:cNvSpPr>
+                <a:spLocks noGrp="1"/>
+              </p:cNvSpPr>
+              <p:nvPr>
+                <p:ph idx="1"/>
+              </p:nvPr>
+            </p:nvSpPr>
+            <p:spPr/>
+            <p:txBody>
+              <a:bodyPr/>
+              <a:lstStyle/>
+              <a:p>
+                <a:r>
+                  <a:rPr lang="en-CA" dirty="0"/>
+                  <a:t>Maximize profile likelihood</a:t>
+                </a:r>
+              </a:p>
+              <a:p>
+                <a:endParaRPr lang="en-CA" dirty="0"/>
+              </a:p>
+              <a:p>
+                <a:r>
+                  <a:rPr lang="en-CA" dirty="0"/>
+                  <a:t>Include all </a:t>
+                </a:r>
+                <a14:m>
+                  <m:oMath xmlns:m="http://schemas.openxmlformats.org/officeDocument/2006/math">
+                    <m:r>
+                      <a:rPr lang="en-CA" b="0" i="1" smtClean="0">
+                        <a:latin typeface="Cambria Math" panose="02040503050406030204" pitchFamily="18" charset="0"/>
+                      </a:rPr>
+                      <m:t>𝛾</m:t>
+                    </m:r>
+                  </m:oMath>
+                </a14:m>
+                <a:r>
+                  <a:rPr lang="en-CA" dirty="0"/>
+                  <a:t> with likelihood within </a:t>
+                </a:r>
+                <a14:m>
+                  <m:oMath xmlns:m="http://schemas.openxmlformats.org/officeDocument/2006/math">
+                    <m:r>
+                      <a:rPr lang="en-CA" b="0" i="0" smtClean="0">
+                        <a:latin typeface="Cambria Math" panose="02040503050406030204" pitchFamily="18" charset="0"/>
+                      </a:rPr>
+                      <m:t>~</m:t>
+                    </m:r>
+                    <m:r>
+                      <a:rPr lang="en-CA" b="0" i="1" smtClean="0">
+                        <a:latin typeface="Cambria Math" panose="02040503050406030204" pitchFamily="18" charset="0"/>
+                      </a:rPr>
+                      <m:t>2</m:t>
+                    </m:r>
+                  </m:oMath>
+                </a14:m>
+                <a:r>
+                  <a:rPr lang="en-CA" dirty="0"/>
+                  <a:t> of maximum</a:t>
+                </a:r>
+              </a:p>
+              <a:p>
+                <a:endParaRPr lang="en-CA" dirty="0"/>
+              </a:p>
+              <a:p>
+                <a:endParaRPr lang="en-CA" dirty="0"/>
+              </a:p>
+              <a:p>
+                <a:endParaRPr lang="en-CA" dirty="0"/>
+              </a:p>
+            </p:txBody>
+          </p:sp>
+        </mc:Choice>
+        <mc:Fallback>
+          <p:sp>
+            <p:nvSpPr>
+              <p:cNvPr id="3" name="Content Placeholder 2">
+                <a:extLst>
+                  <a:ext uri="{FF2B5EF4-FFF2-40B4-BE49-F238E27FC236}">
+                    <a16:creationId xmlns:a16="http://schemas.microsoft.com/office/drawing/2014/main" id="{899A185B-0966-4635-B23D-062B4F969B65}"/>
+                  </a:ext>
+                </a:extLst>
+              </p:cNvPr>
+              <p:cNvSpPr>
+                <a:spLocks noGrp="1" noRot="1" noChangeAspect="1" noMove="1" noResize="1" noEditPoints="1" noAdjustHandles="1" noChangeArrowheads="1" noChangeShapeType="1" noTextEdit="1"/>
+              </p:cNvSpPr>
+              <p:nvPr>
+                <p:ph idx="1"/>
+              </p:nvPr>
+            </p:nvSpPr>
+            <p:spPr>
+              <a:blipFill>
+                <a:blip r:embed="rId2"/>
+                <a:stretch>
+                  <a:fillRect l="-1333" t="-2941"/>
+                </a:stretch>
+              </a:blipFill>
+            </p:spPr>
+            <p:txBody>
+              <a:bodyPr/>
+              <a:lstStyle/>
+              <a:p>
+                <a:r>
+                  <a:rPr lang="en-CA">
+                    <a:noFill/>
+                  </a:rPr>
+                  <a:t> </a:t>
+                </a:r>
+              </a:p>
+            </p:txBody>
+          </p:sp>
+        </mc:Fallback>
+      </mc:AlternateContent>
+      <mc:AlternateContent xmlns:mc="http://schemas.openxmlformats.org/markup-compatibility/2006">
+        <mc:Choice xmlns:a14="http://schemas.microsoft.com/office/drawing/2010/main" Requires="a14">
+          <p:graphicFrame>
+            <p:nvGraphicFramePr>
+              <p:cNvPr id="4" name="Table 4">
+                <a:extLst>
+                  <a:ext uri="{FF2B5EF4-FFF2-40B4-BE49-F238E27FC236}">
+                    <a16:creationId xmlns:a16="http://schemas.microsoft.com/office/drawing/2014/main" id="{1BE8FCA0-F26E-4D52-A775-AF67A31A2758}"/>
+                  </a:ext>
+                </a:extLst>
+              </p:cNvPr>
+              <p:cNvGraphicFramePr>
+                <a:graphicFrameLocks noGrp="1"/>
+              </p:cNvGraphicFramePr>
+              <p:nvPr>
+                <p:extLst>
+                  <p:ext uri="{D42A27DB-BD31-4B8C-83A1-F6EECF244321}">
+                    <p14:modId xmlns:p14="http://schemas.microsoft.com/office/powerpoint/2010/main" val="2204221462"/>
+                  </p:ext>
+                </p:extLst>
+              </p:nvPr>
+            </p:nvGraphicFramePr>
+            <p:xfrm>
+              <a:off x="1615089" y="4001294"/>
+              <a:ext cx="8961822" cy="1771206"/>
+            </p:xfrm>
+            <a:graphic>
+              <a:graphicData uri="http://schemas.openxmlformats.org/drawingml/2006/table">
+                <a:tbl>
+                  <a:tblPr>
+                    <a:tableStyleId>{073A0DAA-6AF3-43AB-8588-CEC1D06C72B9}</a:tableStyleId>
+                  </a:tblPr>
+                  <a:tblGrid>
+                    <a:gridCol w="4480911">
+                      <a:extLst>
+                        <a:ext uri="{9D8B030D-6E8A-4147-A177-3AD203B41FA5}">
+                          <a16:colId xmlns:a16="http://schemas.microsoft.com/office/drawing/2014/main" val="705846906"/>
+                        </a:ext>
+                      </a:extLst>
+                    </a:gridCol>
+                    <a:gridCol w="4480911">
+                      <a:extLst>
+                        <a:ext uri="{9D8B030D-6E8A-4147-A177-3AD203B41FA5}">
+                          <a16:colId xmlns:a16="http://schemas.microsoft.com/office/drawing/2014/main" val="1624902210"/>
+                        </a:ext>
+                      </a:extLst>
+                    </a:gridCol>
+                  </a:tblGrid>
+                  <a:tr h="370840">
+                    <a:tc>
+                      <a:txBody>
+                        <a:bodyPr/>
+                        <a:lstStyle/>
+                        <a:p>
+                          <a:pPr marL="457200" indent="-457200" algn="ctr">
+                            <a:buFont typeface="Arial" panose="020B0604020202020204" pitchFamily="34" charset="0"/>
+                            <a:buChar char="•"/>
+                          </a:pPr>
+                          <a14:m>
+                            <m:oMath xmlns:m="http://schemas.openxmlformats.org/officeDocument/2006/math">
+                              <m:r>
+                                <a:rPr lang="en-CA" sz="3200" smtClean="0"/>
+                                <m:t>𝑍</m:t>
+                              </m:r>
+                              <m:r>
+                                <a:rPr lang="en-CA" sz="3200" smtClean="0"/>
+                                <m:t>=</m:t>
+                              </m:r>
+                              <m:r>
+                                <m:rPr>
+                                  <m:sty m:val="p"/>
+                                </m:rPr>
+                                <a:rPr lang="en-CA" sz="3200" smtClean="0"/>
+                                <m:t>X</m:t>
+                              </m:r>
+                              <m:r>
+                                <a:rPr lang="en-CA" sz="3200" smtClean="0"/>
+                                <m:t>𝛽</m:t>
+                              </m:r>
+                              <m:r>
+                                <a:rPr lang="en-CA" sz="3200" smtClean="0"/>
+                                <m:t>+</m:t>
+                              </m:r>
+                              <m:r>
+                                <a:rPr lang="en-CA" sz="3200" smtClean="0"/>
+                                <m:t>𝜎𝜀</m:t>
+                              </m:r>
+                            </m:oMath>
+                          </a14:m>
+                          <a:endParaRPr lang="en-CA" sz="3200" dirty="0"/>
+                        </a:p>
+                      </a:txBody>
+                      <a:tcPr/>
+                    </a:tc>
+                    <a:tc>
+                      <a:txBody>
+                        <a:bodyPr/>
+                        <a:lstStyle/>
+                        <a:p>
+                          <a:pPr marL="457200" marR="0" lvl="0" indent="-457200" algn="ctr" defTabSz="914400" rtl="0" eaLnBrk="1" fontAlgn="auto" latinLnBrk="0" hangingPunct="1">
+                            <a:lnSpc>
+                              <a:spcPct val="100000"/>
+                            </a:lnSpc>
+                            <a:spcBef>
+                              <a:spcPts val="0"/>
+                            </a:spcBef>
+                            <a:spcAft>
+                              <a:spcPts val="0"/>
+                            </a:spcAft>
+                            <a:buClrTx/>
+                            <a:buSzTx/>
+                            <a:buFont typeface="Arial" panose="020B0604020202020204" pitchFamily="34" charset="0"/>
+                            <a:buChar char="•"/>
+                            <a:tabLst/>
+                            <a:defRPr/>
+                          </a:pPr>
+                          <a14:m>
+                            <m:oMath xmlns:m="http://schemas.openxmlformats.org/officeDocument/2006/math">
+                              <m:r>
+                                <a:rPr lang="en-CA" sz="3200" smtClean="0"/>
+                                <m:t>𝑛</m:t>
+                              </m:r>
+                              <m:r>
+                                <a:rPr lang="en-CA" sz="3200" smtClean="0"/>
+                                <m:t>=100</m:t>
+                              </m:r>
+                            </m:oMath>
+                          </a14:m>
+                          <a:endParaRPr lang="en-CA" sz="3200" dirty="0"/>
+                        </a:p>
+                      </a:txBody>
+                      <a:tcPr/>
+                    </a:tc>
+                    <a:extLst>
+                      <a:ext uri="{0D108BD9-81ED-4DB2-BD59-A6C34878D82A}">
+                        <a16:rowId xmlns:a16="http://schemas.microsoft.com/office/drawing/2014/main" val="13183627"/>
+                      </a:ext>
+                    </a:extLst>
+                  </a:tr>
+                  <a:tr h="370840">
+                    <a:tc>
+                      <a:txBody>
+                        <a:bodyPr/>
+                        <a:lstStyle/>
+                        <a:p>
+                          <a:pPr marL="457200" indent="-457200" algn="ctr">
+                            <a:buFont typeface="Arial" panose="020B0604020202020204" pitchFamily="34" charset="0"/>
+                            <a:buChar char="•"/>
+                          </a:pPr>
+                          <a14:m>
+                            <m:oMath xmlns:m="http://schemas.openxmlformats.org/officeDocument/2006/math">
+                              <m:r>
+                                <a:rPr lang="en-CA" sz="3200" smtClean="0"/>
+                                <m:t>𝜀</m:t>
+                              </m:r>
+                            </m:oMath>
+                          </a14:m>
+                          <a:r>
+                            <a:rPr lang="en-CA" sz="3200" dirty="0"/>
+                            <a:t> standard normal</a:t>
+                          </a:r>
+                        </a:p>
+                      </a:txBody>
+                      <a:tcPr/>
+                    </a:tc>
+                    <a:tc>
+                      <a:txBody>
+                        <a:bodyPr/>
+                        <a:lstStyle/>
+                        <a:p>
+                          <a:pPr marL="457200" indent="-457200" algn="ctr">
+                            <a:buFont typeface="Arial" panose="020B0604020202020204" pitchFamily="34" charset="0"/>
+                            <a:buChar char="•"/>
+                          </a:pPr>
+                          <a14:m>
+                            <m:oMath xmlns:m="http://schemas.openxmlformats.org/officeDocument/2006/math">
+                              <m:r>
+                                <a:rPr lang="en-CA" sz="3200" smtClean="0"/>
+                                <m:t>𝑌</m:t>
+                              </m:r>
+                              <m:r>
+                                <a:rPr lang="en-CA" sz="3200" smtClean="0"/>
+                                <m:t>=</m:t>
+                              </m:r>
+                              <m:sSubSup>
+                                <m:sSubSupPr>
+                                  <m:ctrlPr>
+                                    <a:rPr lang="en-CA" sz="3200" smtClean="0"/>
+                                  </m:ctrlPr>
+                                </m:sSubSupPr>
+                                <m:e>
+                                  <m:r>
+                                    <a:rPr lang="en-CA" sz="3200" smtClean="0"/>
+                                    <m:t>h</m:t>
+                                  </m:r>
+                                </m:e>
+                                <m:sub>
+                                  <m:r>
+                                    <a:rPr lang="en-CA" sz="3200" smtClean="0"/>
+                                    <m:t>0</m:t>
+                                  </m:r>
+                                </m:sub>
+                                <m:sup>
+                                  <m:r>
+                                    <a:rPr lang="en-CA" sz="3200" smtClean="0"/>
+                                    <m:t>−1</m:t>
+                                  </m:r>
+                                </m:sup>
+                              </m:sSubSup>
+                              <m:d>
+                                <m:dPr>
+                                  <m:ctrlPr>
+                                    <a:rPr lang="en-CA" sz="3200" smtClean="0"/>
+                                  </m:ctrlPr>
+                                </m:dPr>
+                                <m:e>
+                                  <m:r>
+                                    <a:rPr lang="en-CA" sz="3200" smtClean="0"/>
+                                    <m:t>𝑍</m:t>
+                                  </m:r>
+                                </m:e>
+                              </m:d>
+                              <m:r>
+                                <a:rPr lang="en-CA" sz="3200" smtClean="0"/>
+                                <m:t>=</m:t>
+                              </m:r>
+                              <m:func>
+                                <m:funcPr>
+                                  <m:ctrlPr>
+                                    <a:rPr lang="en-CA" sz="3200" smtClean="0"/>
+                                  </m:ctrlPr>
+                                </m:funcPr>
+                                <m:fName>
+                                  <m:r>
+                                    <m:rPr>
+                                      <m:sty m:val="p"/>
+                                    </m:rPr>
+                                    <a:rPr lang="en-CA" sz="3200" smtClean="0"/>
+                                    <m:t>exp</m:t>
+                                  </m:r>
+                                </m:fName>
+                                <m:e>
+                                  <m:d>
+                                    <m:dPr>
+                                      <m:ctrlPr>
+                                        <a:rPr lang="en-CA" sz="3200" smtClean="0"/>
+                                      </m:ctrlPr>
+                                    </m:dPr>
+                                    <m:e>
+                                      <m:r>
+                                        <a:rPr lang="en-CA" sz="3200" smtClean="0"/>
+                                        <m:t>𝑍</m:t>
+                                      </m:r>
+                                    </m:e>
+                                  </m:d>
+                                </m:e>
+                              </m:func>
+                            </m:oMath>
+                          </a14:m>
+                          <a:endParaRPr lang="en-CA" sz="3200" dirty="0"/>
+                        </a:p>
+                      </a:txBody>
+                      <a:tcPr/>
+                    </a:tc>
+                    <a:extLst>
+                      <a:ext uri="{0D108BD9-81ED-4DB2-BD59-A6C34878D82A}">
+                        <a16:rowId xmlns:a16="http://schemas.microsoft.com/office/drawing/2014/main" val="1894105132"/>
+                      </a:ext>
+                    </a:extLst>
+                  </a:tr>
+                  <a:tr h="370840">
+                    <a:tc>
+                      <a:txBody>
+                        <a:bodyPr/>
+                        <a:lstStyle/>
+                        <a:p>
+                          <a:pPr marL="457200" indent="-457200" algn="ctr">
+                            <a:buFont typeface="Arial" panose="020B0604020202020204" pitchFamily="34" charset="0"/>
+                            <a:buChar char="•"/>
+                          </a:pPr>
+                          <a14:m>
+                            <m:oMath xmlns:m="http://schemas.openxmlformats.org/officeDocument/2006/math">
+                              <m:r>
+                                <a:rPr lang="en-CA" sz="3200" smtClean="0"/>
+                                <m:t>𝛽</m:t>
+                              </m:r>
+                            </m:oMath>
+                          </a14:m>
+                          <a:r>
+                            <a:rPr lang="en-CA" sz="3200" dirty="0"/>
+                            <a:t> square-root sparse</a:t>
+                          </a:r>
+                        </a:p>
+                      </a:txBody>
+                      <a:tcPr/>
+                    </a:tc>
+                    <a:tc>
+                      <a:txBody>
+                        <a:bodyPr/>
+                        <a:lstStyle/>
+                        <a:p>
+                          <a:pPr marL="457200" indent="-457200" algn="ctr">
+                            <a:buFont typeface="Arial" panose="020B0604020202020204" pitchFamily="34" charset="0"/>
+                            <a:buChar char="•"/>
+                          </a:pPr>
+                          <a:endParaRPr lang="en-CA" sz="3200" dirty="0"/>
+                        </a:p>
+                      </a:txBody>
+                      <a:tcPr/>
+                    </a:tc>
+                    <a:extLst>
+                      <a:ext uri="{0D108BD9-81ED-4DB2-BD59-A6C34878D82A}">
+                        <a16:rowId xmlns:a16="http://schemas.microsoft.com/office/drawing/2014/main" val="1653310339"/>
+                      </a:ext>
+                    </a:extLst>
+                  </a:tr>
+                </a:tbl>
+              </a:graphicData>
+            </a:graphic>
+          </p:graphicFrame>
+        </mc:Choice>
+        <mc:Fallback>
+          <p:graphicFrame>
+            <p:nvGraphicFramePr>
+              <p:cNvPr id="4" name="Table 4">
+                <a:extLst>
+                  <a:ext uri="{FF2B5EF4-FFF2-40B4-BE49-F238E27FC236}">
+                    <a16:creationId xmlns:a16="http://schemas.microsoft.com/office/drawing/2014/main" id="{1BE8FCA0-F26E-4D52-A775-AF67A31A2758}"/>
+                  </a:ext>
+                </a:extLst>
+              </p:cNvPr>
+              <p:cNvGraphicFramePr>
+                <a:graphicFrameLocks noGrp="1"/>
+              </p:cNvGraphicFramePr>
+              <p:nvPr>
+                <p:extLst>
+                  <p:ext uri="{D42A27DB-BD31-4B8C-83A1-F6EECF244321}">
+                    <p14:modId xmlns:p14="http://schemas.microsoft.com/office/powerpoint/2010/main" val="2204221462"/>
+                  </p:ext>
+                </p:extLst>
+              </p:nvPr>
+            </p:nvGraphicFramePr>
+            <p:xfrm>
+              <a:off x="1615089" y="4001294"/>
+              <a:ext cx="8961822" cy="1771206"/>
+            </p:xfrm>
+            <a:graphic>
+              <a:graphicData uri="http://schemas.openxmlformats.org/drawingml/2006/table">
+                <a:tbl>
+                  <a:tblPr>
+                    <a:tableStyleId>{073A0DAA-6AF3-43AB-8588-CEC1D06C72B9}</a:tableStyleId>
+                  </a:tblPr>
+                  <a:tblGrid>
+                    <a:gridCol w="4480911">
+                      <a:extLst>
+                        <a:ext uri="{9D8B030D-6E8A-4147-A177-3AD203B41FA5}">
+                          <a16:colId xmlns:a16="http://schemas.microsoft.com/office/drawing/2014/main" val="705846906"/>
+                        </a:ext>
+                      </a:extLst>
+                    </a:gridCol>
+                    <a:gridCol w="4480911">
+                      <a:extLst>
+                        <a:ext uri="{9D8B030D-6E8A-4147-A177-3AD203B41FA5}">
+                          <a16:colId xmlns:a16="http://schemas.microsoft.com/office/drawing/2014/main" val="1624902210"/>
+                        </a:ext>
+                      </a:extLst>
+                    </a:gridCol>
+                  </a:tblGrid>
+                  <a:tr h="579120">
+                    <a:tc>
+                      <a:txBody>
+                        <a:bodyPr/>
+                        <a:lstStyle/>
+                        <a:p>
+                          <a:endParaRPr lang="en-US"/>
+                        </a:p>
+                      </a:txBody>
+                      <a:tcPr>
+                        <a:blipFill>
+                          <a:blip r:embed="rId3"/>
+                          <a:stretch>
+                            <a:fillRect l="-136" t="-1053" r="-100272" b="-242105"/>
+                          </a:stretch>
+                        </a:blipFill>
+                      </a:tcPr>
+                    </a:tc>
+                    <a:tc>
+                      <a:txBody>
+                        <a:bodyPr/>
+                        <a:lstStyle/>
+                        <a:p>
+                          <a:endParaRPr lang="en-US"/>
+                        </a:p>
+                      </a:txBody>
+                      <a:tcPr>
+                        <a:blipFill>
+                          <a:blip r:embed="rId3"/>
+                          <a:stretch>
+                            <a:fillRect l="-100136" t="-1053" r="-272" b="-242105"/>
+                          </a:stretch>
+                        </a:blipFill>
+                      </a:tcPr>
+                    </a:tc>
+                    <a:extLst>
+                      <a:ext uri="{0D108BD9-81ED-4DB2-BD59-A6C34878D82A}">
+                        <a16:rowId xmlns:a16="http://schemas.microsoft.com/office/drawing/2014/main" val="13183627"/>
+                      </a:ext>
+                    </a:extLst>
+                  </a:tr>
+                  <a:tr h="612966">
+                    <a:tc>
+                      <a:txBody>
+                        <a:bodyPr/>
+                        <a:lstStyle/>
+                        <a:p>
+                          <a:endParaRPr lang="en-US"/>
+                        </a:p>
+                      </a:txBody>
+                      <a:tcPr>
+                        <a:blipFill>
+                          <a:blip r:embed="rId3"/>
+                          <a:stretch>
+                            <a:fillRect l="-136" t="-95050" r="-100272" b="-127723"/>
+                          </a:stretch>
+                        </a:blipFill>
+                      </a:tcPr>
+                    </a:tc>
+                    <a:tc>
+                      <a:txBody>
+                        <a:bodyPr/>
+                        <a:lstStyle/>
+                        <a:p>
+                          <a:endParaRPr lang="en-US"/>
+                        </a:p>
+                      </a:txBody>
+                      <a:tcPr>
+                        <a:blipFill>
+                          <a:blip r:embed="rId3"/>
+                          <a:stretch>
+                            <a:fillRect l="-100136" t="-95050" r="-272" b="-127723"/>
+                          </a:stretch>
+                        </a:blipFill>
+                      </a:tcPr>
+                    </a:tc>
+                    <a:extLst>
+                      <a:ext uri="{0D108BD9-81ED-4DB2-BD59-A6C34878D82A}">
+                        <a16:rowId xmlns:a16="http://schemas.microsoft.com/office/drawing/2014/main" val="1894105132"/>
+                      </a:ext>
+                    </a:extLst>
+                  </a:tr>
+                  <a:tr h="579120">
+                    <a:tc>
+                      <a:txBody>
+                        <a:bodyPr/>
+                        <a:lstStyle/>
+                        <a:p>
+                          <a:endParaRPr lang="en-US"/>
+                        </a:p>
+                      </a:txBody>
+                      <a:tcPr>
+                        <a:blipFill>
+                          <a:blip r:embed="rId3"/>
+                          <a:stretch>
+                            <a:fillRect l="-136" t="-207368" r="-100272" b="-35789"/>
+                          </a:stretch>
+                        </a:blipFill>
+                      </a:tcPr>
+                    </a:tc>
+                    <a:tc>
+                      <a:txBody>
+                        <a:bodyPr/>
+                        <a:lstStyle/>
+                        <a:p>
+                          <a:pPr marL="457200" indent="-457200" algn="ctr">
+                            <a:buFont typeface="Arial" panose="020B0604020202020204" pitchFamily="34" charset="0"/>
+                            <a:buChar char="•"/>
+                          </a:pPr>
+                          <a:endParaRPr lang="en-CA" sz="3200" dirty="0"/>
+                        </a:p>
+                      </a:txBody>
+                      <a:tcPr/>
+                    </a:tc>
+                    <a:extLst>
+                      <a:ext uri="{0D108BD9-81ED-4DB2-BD59-A6C34878D82A}">
+                        <a16:rowId xmlns:a16="http://schemas.microsoft.com/office/drawing/2014/main" val="1653310339"/>
+                      </a:ext>
+                    </a:extLst>
+                  </a:tr>
+                </a:tbl>
+              </a:graphicData>
+            </a:graphic>
+          </p:graphicFrame>
+        </mc:Fallback>
+      </mc:AlternateContent>
+    </p:spTree>
+    <p:extLst>
+      <p:ext uri="{BB962C8B-B14F-4D97-AF65-F5344CB8AC3E}">
+        <p14:creationId xmlns:p14="http://schemas.microsoft.com/office/powerpoint/2010/main" val="515403854"/>
       </p:ext>
     </p:extLst>
   </p:cSld>
@@ -6766,6 +8212,1574 @@
 </p:sld>
 </file>
 
+<file path=ppt/slides/slide20.xml><?xml version="1.0" encoding="utf-8"?>
+<p:sld xmlns:a="http://schemas.openxmlformats.org/drawingml/2006/main" xmlns:r="http://schemas.openxmlformats.org/officeDocument/2006/relationships" xmlns:p="http://schemas.openxmlformats.org/presentationml/2006/main">
+  <p:cSld>
+    <p:spTree>
+      <p:nvGrpSpPr>
+        <p:cNvPr id="1" name=""/>
+        <p:cNvGrpSpPr/>
+        <p:nvPr/>
+      </p:nvGrpSpPr>
+      <p:grpSpPr>
+        <a:xfrm>
+          <a:off x="0" y="0"/>
+          <a:ext cx="0" cy="0"/>
+          <a:chOff x="0" y="0"/>
+          <a:chExt cx="0" cy="0"/>
+        </a:xfrm>
+      </p:grpSpPr>
+      <p:sp>
+        <p:nvSpPr>
+          <p:cNvPr id="2" name="Title 1">
+            <a:extLst>
+              <a:ext uri="{FF2B5EF4-FFF2-40B4-BE49-F238E27FC236}">
+                <a16:creationId xmlns:a16="http://schemas.microsoft.com/office/drawing/2014/main" id="{17BF818F-B2B8-4C3C-91B4-CE672CD4C18B}"/>
+              </a:ext>
+            </a:extLst>
+          </p:cNvPr>
+          <p:cNvSpPr>
+            <a:spLocks noGrp="1"/>
+          </p:cNvSpPr>
+          <p:nvPr>
+            <p:ph type="title"/>
+          </p:nvPr>
+        </p:nvSpPr>
+        <p:spPr>
+          <a:xfrm>
+            <a:off x="838200" y="365125"/>
+            <a:ext cx="10515600" cy="1325563"/>
+          </a:xfrm>
+        </p:spPr>
+        <p:txBody>
+          <a:bodyPr/>
+          <a:lstStyle/>
+          <a:p>
+            <a:r>
+              <a:rPr lang="en-CA" dirty="0"/>
+              <a:t>Box-Cox Inference</a:t>
+            </a:r>
+          </a:p>
+        </p:txBody>
+      </p:sp>
+      <mc:AlternateContent xmlns:mc="http://schemas.openxmlformats.org/markup-compatibility/2006">
+        <mc:Choice xmlns:a14="http://schemas.microsoft.com/office/drawing/2010/main" Requires="a14">
+          <p:graphicFrame>
+            <p:nvGraphicFramePr>
+              <p:cNvPr id="4" name="Table 4">
+                <a:extLst>
+                  <a:ext uri="{FF2B5EF4-FFF2-40B4-BE49-F238E27FC236}">
+                    <a16:creationId xmlns:a16="http://schemas.microsoft.com/office/drawing/2014/main" id="{AFC202DD-30BA-49E8-83F4-830A76520B09}"/>
+                  </a:ext>
+                </a:extLst>
+              </p:cNvPr>
+              <p:cNvGraphicFramePr>
+                <a:graphicFrameLocks noGrp="1"/>
+              </p:cNvGraphicFramePr>
+              <p:nvPr>
+                <p:ph idx="1"/>
+                <p:extLst>
+                  <p:ext uri="{D42A27DB-BD31-4B8C-83A1-F6EECF244321}">
+                    <p14:modId xmlns:p14="http://schemas.microsoft.com/office/powerpoint/2010/main" val="3007764813"/>
+                  </p:ext>
+                </p:extLst>
+              </p:nvPr>
+            </p:nvGraphicFramePr>
+            <p:xfrm>
+              <a:off x="838200" y="1844040"/>
+              <a:ext cx="10515603" cy="1584960"/>
+            </p:xfrm>
+            <a:graphic>
+              <a:graphicData uri="http://schemas.openxmlformats.org/drawingml/2006/table">
+                <a:tbl>
+                  <a:tblPr bandRow="1">
+                    <a:tableStyleId>{073A0DAA-6AF3-43AB-8588-CEC1D06C72B9}</a:tableStyleId>
+                  </a:tblPr>
+                  <a:tblGrid>
+                    <a:gridCol w="1502229">
+                      <a:extLst>
+                        <a:ext uri="{9D8B030D-6E8A-4147-A177-3AD203B41FA5}">
+                          <a16:colId xmlns:a16="http://schemas.microsoft.com/office/drawing/2014/main" val="902157614"/>
+                        </a:ext>
+                      </a:extLst>
+                    </a:gridCol>
+                    <a:gridCol w="1502229">
+                      <a:extLst>
+                        <a:ext uri="{9D8B030D-6E8A-4147-A177-3AD203B41FA5}">
+                          <a16:colId xmlns:a16="http://schemas.microsoft.com/office/drawing/2014/main" val="3810277463"/>
+                        </a:ext>
+                      </a:extLst>
+                    </a:gridCol>
+                    <a:gridCol w="1502229">
+                      <a:extLst>
+                        <a:ext uri="{9D8B030D-6E8A-4147-A177-3AD203B41FA5}">
+                          <a16:colId xmlns:a16="http://schemas.microsoft.com/office/drawing/2014/main" val="3835867625"/>
+                        </a:ext>
+                      </a:extLst>
+                    </a:gridCol>
+                    <a:gridCol w="1502229">
+                      <a:extLst>
+                        <a:ext uri="{9D8B030D-6E8A-4147-A177-3AD203B41FA5}">
+                          <a16:colId xmlns:a16="http://schemas.microsoft.com/office/drawing/2014/main" val="4259846121"/>
+                        </a:ext>
+                      </a:extLst>
+                    </a:gridCol>
+                    <a:gridCol w="1502229">
+                      <a:extLst>
+                        <a:ext uri="{9D8B030D-6E8A-4147-A177-3AD203B41FA5}">
+                          <a16:colId xmlns:a16="http://schemas.microsoft.com/office/drawing/2014/main" val="12837104"/>
+                        </a:ext>
+                      </a:extLst>
+                    </a:gridCol>
+                    <a:gridCol w="1502229">
+                      <a:extLst>
+                        <a:ext uri="{9D8B030D-6E8A-4147-A177-3AD203B41FA5}">
+                          <a16:colId xmlns:a16="http://schemas.microsoft.com/office/drawing/2014/main" val="2058178894"/>
+                        </a:ext>
+                      </a:extLst>
+                    </a:gridCol>
+                    <a:gridCol w="1502229">
+                      <a:extLst>
+                        <a:ext uri="{9D8B030D-6E8A-4147-A177-3AD203B41FA5}">
+                          <a16:colId xmlns:a16="http://schemas.microsoft.com/office/drawing/2014/main" val="3076216707"/>
+                        </a:ext>
+                      </a:extLst>
+                    </a:gridCol>
+                  </a:tblGrid>
+                  <a:tr h="370840">
+                    <a:tc rowSpan="2">
+                      <a:txBody>
+                        <a:bodyPr/>
+                        <a:lstStyle/>
+                        <a:p>
+                          <a:pPr algn="ctr"/>
+                          <a:r>
+                            <a:rPr lang="en-CA" sz="2000" dirty="0"/>
+                            <a:t>Coverage Probability</a:t>
+                          </a:r>
+                        </a:p>
+                      </a:txBody>
+                      <a:tcPr/>
+                    </a:tc>
+                    <a:tc gridSpan="2">
+                      <a:txBody>
+                        <a:bodyPr/>
+                        <a:lstStyle/>
+                        <a:p>
+                          <a:pPr algn="ctr"/>
+                          <a14:m>
+                            <m:oMathPara xmlns:m="http://schemas.openxmlformats.org/officeDocument/2006/math">
+                              <m:oMathParaPr>
+                                <m:jc m:val="centerGroup"/>
+                              </m:oMathParaPr>
+                              <m:oMath xmlns:m="http://schemas.openxmlformats.org/officeDocument/2006/math">
+                                <m:r>
+                                  <a:rPr lang="en-CA" sz="2000" smtClean="0"/>
+                                  <m:t>𝑝</m:t>
+                                </m:r>
+                                <m:r>
+                                  <a:rPr lang="en-CA" sz="2000" smtClean="0"/>
+                                  <m:t>=10</m:t>
+                                </m:r>
+                              </m:oMath>
+                            </m:oMathPara>
+                          </a14:m>
+                          <a:endParaRPr lang="en-CA" sz="2000" dirty="0"/>
+                        </a:p>
+                      </a:txBody>
+                      <a:tcPr/>
+                    </a:tc>
+                    <a:tc hMerge="1">
+                      <a:txBody>
+                        <a:bodyPr/>
+                        <a:lstStyle/>
+                        <a:p>
+                          <a:pPr algn="ctr"/>
+                          <a:endParaRPr lang="en-CA" dirty="0"/>
+                        </a:p>
+                      </a:txBody>
+                      <a:tcPr/>
+                    </a:tc>
+                    <a:tc gridSpan="2">
+                      <a:txBody>
+                        <a:bodyPr/>
+                        <a:lstStyle/>
+                        <a:p>
+                          <a:pPr algn="ctr"/>
+                          <a14:m>
+                            <m:oMathPara xmlns:m="http://schemas.openxmlformats.org/officeDocument/2006/math">
+                              <m:oMathParaPr>
+                                <m:jc m:val="centerGroup"/>
+                              </m:oMathParaPr>
+                              <m:oMath xmlns:m="http://schemas.openxmlformats.org/officeDocument/2006/math">
+                                <m:r>
+                                  <a:rPr lang="en-CA" sz="2000" smtClean="0"/>
+                                  <m:t>𝑝</m:t>
+                                </m:r>
+                                <m:r>
+                                  <a:rPr lang="en-CA" sz="2000" smtClean="0"/>
+                                  <m:t>=50</m:t>
+                                </m:r>
+                              </m:oMath>
+                            </m:oMathPara>
+                          </a14:m>
+                          <a:endParaRPr lang="en-CA" sz="2000" dirty="0"/>
+                        </a:p>
+                      </a:txBody>
+                      <a:tcPr/>
+                    </a:tc>
+                    <a:tc hMerge="1">
+                      <a:txBody>
+                        <a:bodyPr/>
+                        <a:lstStyle/>
+                        <a:p>
+                          <a:pPr algn="ctr"/>
+                          <a:endParaRPr lang="en-CA" dirty="0"/>
+                        </a:p>
+                      </a:txBody>
+                      <a:tcPr/>
+                    </a:tc>
+                    <a:tc gridSpan="2">
+                      <a:txBody>
+                        <a:bodyPr/>
+                        <a:lstStyle/>
+                        <a:p>
+                          <a:pPr algn="ctr"/>
+                          <a14:m>
+                            <m:oMathPara xmlns:m="http://schemas.openxmlformats.org/officeDocument/2006/math">
+                              <m:oMathParaPr>
+                                <m:jc m:val="centerGroup"/>
+                              </m:oMathParaPr>
+                              <m:oMath xmlns:m="http://schemas.openxmlformats.org/officeDocument/2006/math">
+                                <m:r>
+                                  <a:rPr lang="en-CA" sz="2000" smtClean="0"/>
+                                  <m:t>𝑝</m:t>
+                                </m:r>
+                                <m:r>
+                                  <a:rPr lang="en-CA" sz="2000" smtClean="0"/>
+                                  <m:t>=200</m:t>
+                                </m:r>
+                              </m:oMath>
+                            </m:oMathPara>
+                          </a14:m>
+                          <a:endParaRPr lang="en-CA" sz="2000" dirty="0"/>
+                        </a:p>
+                      </a:txBody>
+                      <a:tcPr/>
+                    </a:tc>
+                    <a:tc hMerge="1">
+                      <a:txBody>
+                        <a:bodyPr/>
+                        <a:lstStyle/>
+                        <a:p>
+                          <a:pPr algn="ctr"/>
+                          <a:endParaRPr lang="en-CA" dirty="0"/>
+                        </a:p>
+                      </a:txBody>
+                      <a:tcPr/>
+                    </a:tc>
+                    <a:extLst>
+                      <a:ext uri="{0D108BD9-81ED-4DB2-BD59-A6C34878D82A}">
+                        <a16:rowId xmlns:a16="http://schemas.microsoft.com/office/drawing/2014/main" val="3851112357"/>
+                      </a:ext>
+                    </a:extLst>
+                  </a:tr>
+                  <a:tr h="370840">
+                    <a:tc vMerge="1">
+                      <a:txBody>
+                        <a:bodyPr/>
+                        <a:lstStyle/>
+                        <a:p>
+                          <a:pPr algn="ctr"/>
+                          <a:endParaRPr lang="en-CA" dirty="0"/>
+                        </a:p>
+                      </a:txBody>
+                      <a:tcPr/>
+                    </a:tc>
+                    <a:tc>
+                      <a:txBody>
+                        <a:bodyPr/>
+                        <a:lstStyle/>
+                        <a:p>
+                          <a:pPr algn="ctr"/>
+                          <a:r>
+                            <a:rPr lang="en-CA" sz="2000" dirty="0"/>
+                            <a:t>SNR low</a:t>
+                          </a:r>
+                        </a:p>
+                      </a:txBody>
+                      <a:tcPr/>
+                    </a:tc>
+                    <a:tc>
+                      <a:txBody>
+                        <a:bodyPr/>
+                        <a:lstStyle/>
+                        <a:p>
+                          <a:pPr algn="ctr"/>
+                          <a:r>
+                            <a:rPr lang="en-CA" sz="2000" dirty="0"/>
+                            <a:t>SNR high</a:t>
+                          </a:r>
+                        </a:p>
+                      </a:txBody>
+                      <a:tcPr/>
+                    </a:tc>
+                    <a:tc>
+                      <a:txBody>
+                        <a:bodyPr/>
+                        <a:lstStyle/>
+                        <a:p>
+                          <a:pPr algn="ctr"/>
+                          <a:r>
+                            <a:rPr lang="en-CA" sz="2000" dirty="0"/>
+                            <a:t>SNR low</a:t>
+                          </a:r>
+                        </a:p>
+                      </a:txBody>
+                      <a:tcPr/>
+                    </a:tc>
+                    <a:tc>
+                      <a:txBody>
+                        <a:bodyPr/>
+                        <a:lstStyle/>
+                        <a:p>
+                          <a:pPr algn="ctr"/>
+                          <a:r>
+                            <a:rPr lang="en-CA" sz="2000" dirty="0"/>
+                            <a:t>SNR high</a:t>
+                          </a:r>
+                        </a:p>
+                      </a:txBody>
+                      <a:tcPr/>
+                    </a:tc>
+                    <a:tc>
+                      <a:txBody>
+                        <a:bodyPr/>
+                        <a:lstStyle/>
+                        <a:p>
+                          <a:pPr algn="ctr"/>
+                          <a:r>
+                            <a:rPr lang="en-CA" sz="2000" dirty="0"/>
+                            <a:t>SNR low</a:t>
+                          </a:r>
+                        </a:p>
+                      </a:txBody>
+                      <a:tcPr/>
+                    </a:tc>
+                    <a:tc>
+                      <a:txBody>
+                        <a:bodyPr/>
+                        <a:lstStyle/>
+                        <a:p>
+                          <a:pPr algn="ctr"/>
+                          <a:r>
+                            <a:rPr lang="en-CA" sz="2000" dirty="0"/>
+                            <a:t>SNR high</a:t>
+                          </a:r>
+                        </a:p>
+                      </a:txBody>
+                      <a:tcPr/>
+                    </a:tc>
+                    <a:extLst>
+                      <a:ext uri="{0D108BD9-81ED-4DB2-BD59-A6C34878D82A}">
+                        <a16:rowId xmlns:a16="http://schemas.microsoft.com/office/drawing/2014/main" val="2906929121"/>
+                      </a:ext>
+                    </a:extLst>
+                  </a:tr>
+                  <a:tr h="370840">
+                    <a:tc>
+                      <a:txBody>
+                        <a:bodyPr/>
+                        <a:lstStyle/>
+                        <a:p>
+                          <a:pPr algn="ctr"/>
+                          <a:r>
+                            <a:rPr lang="en-CA" sz="2000" dirty="0"/>
+                            <a:t>LS</a:t>
+                          </a:r>
+                        </a:p>
+                      </a:txBody>
+                      <a:tcPr/>
+                    </a:tc>
+                    <a:tc>
+                      <a:txBody>
+                        <a:bodyPr/>
+                        <a:lstStyle/>
+                        <a:p>
+                          <a:pPr algn="ctr"/>
+                          <a:r>
+                            <a:rPr lang="en-CA" sz="2000" dirty="0"/>
+                            <a:t>0.94</a:t>
+                          </a:r>
+                        </a:p>
+                      </a:txBody>
+                      <a:tcPr/>
+                    </a:tc>
+                    <a:tc>
+                      <a:txBody>
+                        <a:bodyPr/>
+                        <a:lstStyle/>
+                        <a:p>
+                          <a:pPr algn="ctr"/>
+                          <a:r>
+                            <a:rPr lang="en-CA" sz="2000" dirty="0"/>
+                            <a:t>0.95</a:t>
+                          </a:r>
+                        </a:p>
+                      </a:txBody>
+                      <a:tcPr/>
+                    </a:tc>
+                    <a:tc>
+                      <a:txBody>
+                        <a:bodyPr/>
+                        <a:lstStyle/>
+                        <a:p>
+                          <a:pPr algn="ctr"/>
+                          <a:r>
+                            <a:rPr lang="en-CA" sz="2000" dirty="0"/>
+                            <a:t>0.93</a:t>
+                          </a:r>
+                        </a:p>
+                      </a:txBody>
+                      <a:tcPr/>
+                    </a:tc>
+                    <a:tc>
+                      <a:txBody>
+                        <a:bodyPr/>
+                        <a:lstStyle/>
+                        <a:p>
+                          <a:pPr algn="ctr"/>
+                          <a:r>
+                            <a:rPr lang="en-CA" sz="2000"/>
+                            <a:t>0.83</a:t>
+                          </a:r>
+                          <a:endParaRPr lang="en-CA" sz="2000" dirty="0"/>
+                        </a:p>
+                      </a:txBody>
+                      <a:tcPr/>
+                    </a:tc>
+                    <a:tc>
+                      <a:txBody>
+                        <a:bodyPr/>
+                        <a:lstStyle/>
+                        <a:p>
+                          <a:pPr algn="ctr"/>
+                          <a:r>
+                            <a:rPr lang="en-CA" sz="2000" dirty="0"/>
+                            <a:t>X</a:t>
+                          </a:r>
+                        </a:p>
+                      </a:txBody>
+                      <a:tcPr/>
+                    </a:tc>
+                    <a:tc>
+                      <a:txBody>
+                        <a:bodyPr/>
+                        <a:lstStyle/>
+                        <a:p>
+                          <a:pPr algn="ctr"/>
+                          <a:r>
+                            <a:rPr lang="en-CA" sz="2000" dirty="0"/>
+                            <a:t>X</a:t>
+                          </a:r>
+                        </a:p>
+                      </a:txBody>
+                      <a:tcPr/>
+                    </a:tc>
+                    <a:extLst>
+                      <a:ext uri="{0D108BD9-81ED-4DB2-BD59-A6C34878D82A}">
+                        <a16:rowId xmlns:a16="http://schemas.microsoft.com/office/drawing/2014/main" val="2845625525"/>
+                      </a:ext>
+                    </a:extLst>
+                  </a:tr>
+                  <a:tr h="370840">
+                    <a:tc>
+                      <a:txBody>
+                        <a:bodyPr/>
+                        <a:lstStyle/>
+                        <a:p>
+                          <a:pPr algn="ctr"/>
+                          <a:r>
+                            <a:rPr lang="en-CA" sz="2000" dirty="0"/>
+                            <a:t>LASSO</a:t>
+                          </a:r>
+                        </a:p>
+                      </a:txBody>
+                      <a:tcPr/>
+                    </a:tc>
+                    <a:tc>
+                      <a:txBody>
+                        <a:bodyPr/>
+                        <a:lstStyle/>
+                        <a:p>
+                          <a:pPr algn="ctr"/>
+                          <a:endParaRPr lang="en-CA" sz="2000"/>
+                        </a:p>
+                      </a:txBody>
+                      <a:tcPr/>
+                    </a:tc>
+                    <a:tc>
+                      <a:txBody>
+                        <a:bodyPr/>
+                        <a:lstStyle/>
+                        <a:p>
+                          <a:pPr algn="ctr"/>
+                          <a:endParaRPr lang="en-CA" sz="2000"/>
+                        </a:p>
+                      </a:txBody>
+                      <a:tcPr/>
+                    </a:tc>
+                    <a:tc>
+                      <a:txBody>
+                        <a:bodyPr/>
+                        <a:lstStyle/>
+                        <a:p>
+                          <a:pPr algn="ctr"/>
+                          <a:endParaRPr lang="en-CA" sz="2000"/>
+                        </a:p>
+                      </a:txBody>
+                      <a:tcPr/>
+                    </a:tc>
+                    <a:tc>
+                      <a:txBody>
+                        <a:bodyPr/>
+                        <a:lstStyle/>
+                        <a:p>
+                          <a:pPr algn="ctr"/>
+                          <a:endParaRPr lang="en-CA" sz="2000" dirty="0"/>
+                        </a:p>
+                      </a:txBody>
+                      <a:tcPr/>
+                    </a:tc>
+                    <a:tc>
+                      <a:txBody>
+                        <a:bodyPr/>
+                        <a:lstStyle/>
+                        <a:p>
+                          <a:pPr algn="ctr"/>
+                          <a:endParaRPr lang="en-CA" sz="2000" dirty="0"/>
+                        </a:p>
+                      </a:txBody>
+                      <a:tcPr/>
+                    </a:tc>
+                    <a:tc>
+                      <a:txBody>
+                        <a:bodyPr/>
+                        <a:lstStyle/>
+                        <a:p>
+                          <a:pPr algn="ctr"/>
+                          <a:endParaRPr lang="en-CA" sz="2000" dirty="0"/>
+                        </a:p>
+                      </a:txBody>
+                      <a:tcPr/>
+                    </a:tc>
+                    <a:extLst>
+                      <a:ext uri="{0D108BD9-81ED-4DB2-BD59-A6C34878D82A}">
+                        <a16:rowId xmlns:a16="http://schemas.microsoft.com/office/drawing/2014/main" val="3108683704"/>
+                      </a:ext>
+                    </a:extLst>
+                  </a:tr>
+                </a:tbl>
+              </a:graphicData>
+            </a:graphic>
+          </p:graphicFrame>
+        </mc:Choice>
+        <mc:Fallback>
+          <p:graphicFrame>
+            <p:nvGraphicFramePr>
+              <p:cNvPr id="4" name="Table 4">
+                <a:extLst>
+                  <a:ext uri="{FF2B5EF4-FFF2-40B4-BE49-F238E27FC236}">
+                    <a16:creationId xmlns:a16="http://schemas.microsoft.com/office/drawing/2014/main" id="{AFC202DD-30BA-49E8-83F4-830A76520B09}"/>
+                  </a:ext>
+                </a:extLst>
+              </p:cNvPr>
+              <p:cNvGraphicFramePr>
+                <a:graphicFrameLocks noGrp="1"/>
+              </p:cNvGraphicFramePr>
+              <p:nvPr>
+                <p:ph idx="1"/>
+                <p:extLst>
+                  <p:ext uri="{D42A27DB-BD31-4B8C-83A1-F6EECF244321}">
+                    <p14:modId xmlns:p14="http://schemas.microsoft.com/office/powerpoint/2010/main" val="3007764813"/>
+                  </p:ext>
+                </p:extLst>
+              </p:nvPr>
+            </p:nvGraphicFramePr>
+            <p:xfrm>
+              <a:off x="838200" y="1844040"/>
+              <a:ext cx="10515603" cy="1584960"/>
+            </p:xfrm>
+            <a:graphic>
+              <a:graphicData uri="http://schemas.openxmlformats.org/drawingml/2006/table">
+                <a:tbl>
+                  <a:tblPr bandRow="1">
+                    <a:tableStyleId>{073A0DAA-6AF3-43AB-8588-CEC1D06C72B9}</a:tableStyleId>
+                  </a:tblPr>
+                  <a:tblGrid>
+                    <a:gridCol w="1502229">
+                      <a:extLst>
+                        <a:ext uri="{9D8B030D-6E8A-4147-A177-3AD203B41FA5}">
+                          <a16:colId xmlns:a16="http://schemas.microsoft.com/office/drawing/2014/main" val="902157614"/>
+                        </a:ext>
+                      </a:extLst>
+                    </a:gridCol>
+                    <a:gridCol w="1502229">
+                      <a:extLst>
+                        <a:ext uri="{9D8B030D-6E8A-4147-A177-3AD203B41FA5}">
+                          <a16:colId xmlns:a16="http://schemas.microsoft.com/office/drawing/2014/main" val="3810277463"/>
+                        </a:ext>
+                      </a:extLst>
+                    </a:gridCol>
+                    <a:gridCol w="1502229">
+                      <a:extLst>
+                        <a:ext uri="{9D8B030D-6E8A-4147-A177-3AD203B41FA5}">
+                          <a16:colId xmlns:a16="http://schemas.microsoft.com/office/drawing/2014/main" val="3835867625"/>
+                        </a:ext>
+                      </a:extLst>
+                    </a:gridCol>
+                    <a:gridCol w="1502229">
+                      <a:extLst>
+                        <a:ext uri="{9D8B030D-6E8A-4147-A177-3AD203B41FA5}">
+                          <a16:colId xmlns:a16="http://schemas.microsoft.com/office/drawing/2014/main" val="4259846121"/>
+                        </a:ext>
+                      </a:extLst>
+                    </a:gridCol>
+                    <a:gridCol w="1502229">
+                      <a:extLst>
+                        <a:ext uri="{9D8B030D-6E8A-4147-A177-3AD203B41FA5}">
+                          <a16:colId xmlns:a16="http://schemas.microsoft.com/office/drawing/2014/main" val="12837104"/>
+                        </a:ext>
+                      </a:extLst>
+                    </a:gridCol>
+                    <a:gridCol w="1502229">
+                      <a:extLst>
+                        <a:ext uri="{9D8B030D-6E8A-4147-A177-3AD203B41FA5}">
+                          <a16:colId xmlns:a16="http://schemas.microsoft.com/office/drawing/2014/main" val="2058178894"/>
+                        </a:ext>
+                      </a:extLst>
+                    </a:gridCol>
+                    <a:gridCol w="1502229">
+                      <a:extLst>
+                        <a:ext uri="{9D8B030D-6E8A-4147-A177-3AD203B41FA5}">
+                          <a16:colId xmlns:a16="http://schemas.microsoft.com/office/drawing/2014/main" val="3076216707"/>
+                        </a:ext>
+                      </a:extLst>
+                    </a:gridCol>
+                  </a:tblGrid>
+                  <a:tr h="396240">
+                    <a:tc rowSpan="2">
+                      <a:txBody>
+                        <a:bodyPr/>
+                        <a:lstStyle/>
+                        <a:p>
+                          <a:pPr algn="ctr"/>
+                          <a:r>
+                            <a:rPr lang="en-CA" sz="2000" dirty="0"/>
+                            <a:t>Coverage Probability</a:t>
+                          </a:r>
+                        </a:p>
+                      </a:txBody>
+                      <a:tcPr/>
+                    </a:tc>
+                    <a:tc gridSpan="2">
+                      <a:txBody>
+                        <a:bodyPr/>
+                        <a:lstStyle/>
+                        <a:p>
+                          <a:endParaRPr lang="en-US"/>
+                        </a:p>
+                      </a:txBody>
+                      <a:tcPr>
+                        <a:blipFill>
+                          <a:blip r:embed="rId2"/>
+                          <a:stretch>
+                            <a:fillRect l="-50304" t="-7692" r="-200406" b="-327692"/>
+                          </a:stretch>
+                        </a:blipFill>
+                      </a:tcPr>
+                    </a:tc>
+                    <a:tc hMerge="1">
+                      <a:txBody>
+                        <a:bodyPr/>
+                        <a:lstStyle/>
+                        <a:p>
+                          <a:pPr algn="ctr"/>
+                          <a:endParaRPr lang="en-CA" dirty="0"/>
+                        </a:p>
+                      </a:txBody>
+                      <a:tcPr/>
+                    </a:tc>
+                    <a:tc gridSpan="2">
+                      <a:txBody>
+                        <a:bodyPr/>
+                        <a:lstStyle/>
+                        <a:p>
+                          <a:endParaRPr lang="en-US"/>
+                        </a:p>
+                      </a:txBody>
+                      <a:tcPr>
+                        <a:blipFill>
+                          <a:blip r:embed="rId2"/>
+                          <a:stretch>
+                            <a:fillRect l="-150304" t="-7692" r="-100406" b="-327692"/>
+                          </a:stretch>
+                        </a:blipFill>
+                      </a:tcPr>
+                    </a:tc>
+                    <a:tc hMerge="1">
+                      <a:txBody>
+                        <a:bodyPr/>
+                        <a:lstStyle/>
+                        <a:p>
+                          <a:pPr algn="ctr"/>
+                          <a:endParaRPr lang="en-CA" dirty="0"/>
+                        </a:p>
+                      </a:txBody>
+                      <a:tcPr/>
+                    </a:tc>
+                    <a:tc gridSpan="2">
+                      <a:txBody>
+                        <a:bodyPr/>
+                        <a:lstStyle/>
+                        <a:p>
+                          <a:endParaRPr lang="en-US"/>
+                        </a:p>
+                      </a:txBody>
+                      <a:tcPr>
+                        <a:blipFill>
+                          <a:blip r:embed="rId2"/>
+                          <a:stretch>
+                            <a:fillRect l="-250304" t="-7692" r="-406" b="-327692"/>
+                          </a:stretch>
+                        </a:blipFill>
+                      </a:tcPr>
+                    </a:tc>
+                    <a:tc hMerge="1">
+                      <a:txBody>
+                        <a:bodyPr/>
+                        <a:lstStyle/>
+                        <a:p>
+                          <a:pPr algn="ctr"/>
+                          <a:endParaRPr lang="en-CA" dirty="0"/>
+                        </a:p>
+                      </a:txBody>
+                      <a:tcPr/>
+                    </a:tc>
+                    <a:extLst>
+                      <a:ext uri="{0D108BD9-81ED-4DB2-BD59-A6C34878D82A}">
+                        <a16:rowId xmlns:a16="http://schemas.microsoft.com/office/drawing/2014/main" val="3851112357"/>
+                      </a:ext>
+                    </a:extLst>
+                  </a:tr>
+                  <a:tr h="396240">
+                    <a:tc vMerge="1">
+                      <a:txBody>
+                        <a:bodyPr/>
+                        <a:lstStyle/>
+                        <a:p>
+                          <a:pPr algn="ctr"/>
+                          <a:endParaRPr lang="en-CA" dirty="0"/>
+                        </a:p>
+                      </a:txBody>
+                      <a:tcPr/>
+                    </a:tc>
+                    <a:tc>
+                      <a:txBody>
+                        <a:bodyPr/>
+                        <a:lstStyle/>
+                        <a:p>
+                          <a:pPr algn="ctr"/>
+                          <a:r>
+                            <a:rPr lang="en-CA" sz="2000" dirty="0"/>
+                            <a:t>SNR low</a:t>
+                          </a:r>
+                        </a:p>
+                      </a:txBody>
+                      <a:tcPr/>
+                    </a:tc>
+                    <a:tc>
+                      <a:txBody>
+                        <a:bodyPr/>
+                        <a:lstStyle/>
+                        <a:p>
+                          <a:pPr algn="ctr"/>
+                          <a:r>
+                            <a:rPr lang="en-CA" sz="2000" dirty="0"/>
+                            <a:t>SNR high</a:t>
+                          </a:r>
+                        </a:p>
+                      </a:txBody>
+                      <a:tcPr/>
+                    </a:tc>
+                    <a:tc>
+                      <a:txBody>
+                        <a:bodyPr/>
+                        <a:lstStyle/>
+                        <a:p>
+                          <a:pPr algn="ctr"/>
+                          <a:r>
+                            <a:rPr lang="en-CA" sz="2000" dirty="0"/>
+                            <a:t>SNR low</a:t>
+                          </a:r>
+                        </a:p>
+                      </a:txBody>
+                      <a:tcPr/>
+                    </a:tc>
+                    <a:tc>
+                      <a:txBody>
+                        <a:bodyPr/>
+                        <a:lstStyle/>
+                        <a:p>
+                          <a:pPr algn="ctr"/>
+                          <a:r>
+                            <a:rPr lang="en-CA" sz="2000" dirty="0"/>
+                            <a:t>SNR high</a:t>
+                          </a:r>
+                        </a:p>
+                      </a:txBody>
+                      <a:tcPr/>
+                    </a:tc>
+                    <a:tc>
+                      <a:txBody>
+                        <a:bodyPr/>
+                        <a:lstStyle/>
+                        <a:p>
+                          <a:pPr algn="ctr"/>
+                          <a:r>
+                            <a:rPr lang="en-CA" sz="2000" dirty="0"/>
+                            <a:t>SNR low</a:t>
+                          </a:r>
+                        </a:p>
+                      </a:txBody>
+                      <a:tcPr/>
+                    </a:tc>
+                    <a:tc>
+                      <a:txBody>
+                        <a:bodyPr/>
+                        <a:lstStyle/>
+                        <a:p>
+                          <a:pPr algn="ctr"/>
+                          <a:r>
+                            <a:rPr lang="en-CA" sz="2000" dirty="0"/>
+                            <a:t>SNR high</a:t>
+                          </a:r>
+                        </a:p>
+                      </a:txBody>
+                      <a:tcPr/>
+                    </a:tc>
+                    <a:extLst>
+                      <a:ext uri="{0D108BD9-81ED-4DB2-BD59-A6C34878D82A}">
+                        <a16:rowId xmlns:a16="http://schemas.microsoft.com/office/drawing/2014/main" val="2906929121"/>
+                      </a:ext>
+                    </a:extLst>
+                  </a:tr>
+                  <a:tr h="396240">
+                    <a:tc>
+                      <a:txBody>
+                        <a:bodyPr/>
+                        <a:lstStyle/>
+                        <a:p>
+                          <a:pPr algn="ctr"/>
+                          <a:r>
+                            <a:rPr lang="en-CA" sz="2000" dirty="0"/>
+                            <a:t>LS</a:t>
+                          </a:r>
+                        </a:p>
+                      </a:txBody>
+                      <a:tcPr/>
+                    </a:tc>
+                    <a:tc>
+                      <a:txBody>
+                        <a:bodyPr/>
+                        <a:lstStyle/>
+                        <a:p>
+                          <a:pPr algn="ctr"/>
+                          <a:r>
+                            <a:rPr lang="en-CA" sz="2000" dirty="0"/>
+                            <a:t>0.94</a:t>
+                          </a:r>
+                        </a:p>
+                      </a:txBody>
+                      <a:tcPr/>
+                    </a:tc>
+                    <a:tc>
+                      <a:txBody>
+                        <a:bodyPr/>
+                        <a:lstStyle/>
+                        <a:p>
+                          <a:pPr algn="ctr"/>
+                          <a:r>
+                            <a:rPr lang="en-CA" sz="2000" dirty="0"/>
+                            <a:t>0.95</a:t>
+                          </a:r>
+                        </a:p>
+                      </a:txBody>
+                      <a:tcPr/>
+                    </a:tc>
+                    <a:tc>
+                      <a:txBody>
+                        <a:bodyPr/>
+                        <a:lstStyle/>
+                        <a:p>
+                          <a:pPr algn="ctr"/>
+                          <a:r>
+                            <a:rPr lang="en-CA" sz="2000" dirty="0"/>
+                            <a:t>0.93</a:t>
+                          </a:r>
+                        </a:p>
+                      </a:txBody>
+                      <a:tcPr/>
+                    </a:tc>
+                    <a:tc>
+                      <a:txBody>
+                        <a:bodyPr/>
+                        <a:lstStyle/>
+                        <a:p>
+                          <a:pPr algn="ctr"/>
+                          <a:r>
+                            <a:rPr lang="en-CA" sz="2000"/>
+                            <a:t>0.83</a:t>
+                          </a:r>
+                          <a:endParaRPr lang="en-CA" sz="2000" dirty="0"/>
+                        </a:p>
+                      </a:txBody>
+                      <a:tcPr/>
+                    </a:tc>
+                    <a:tc>
+                      <a:txBody>
+                        <a:bodyPr/>
+                        <a:lstStyle/>
+                        <a:p>
+                          <a:pPr algn="ctr"/>
+                          <a:r>
+                            <a:rPr lang="en-CA" sz="2000" dirty="0"/>
+                            <a:t>X</a:t>
+                          </a:r>
+                        </a:p>
+                      </a:txBody>
+                      <a:tcPr/>
+                    </a:tc>
+                    <a:tc>
+                      <a:txBody>
+                        <a:bodyPr/>
+                        <a:lstStyle/>
+                        <a:p>
+                          <a:pPr algn="ctr"/>
+                          <a:r>
+                            <a:rPr lang="en-CA" sz="2000" dirty="0"/>
+                            <a:t>X</a:t>
+                          </a:r>
+                        </a:p>
+                      </a:txBody>
+                      <a:tcPr/>
+                    </a:tc>
+                    <a:extLst>
+                      <a:ext uri="{0D108BD9-81ED-4DB2-BD59-A6C34878D82A}">
+                        <a16:rowId xmlns:a16="http://schemas.microsoft.com/office/drawing/2014/main" val="2845625525"/>
+                      </a:ext>
+                    </a:extLst>
+                  </a:tr>
+                  <a:tr h="396240">
+                    <a:tc>
+                      <a:txBody>
+                        <a:bodyPr/>
+                        <a:lstStyle/>
+                        <a:p>
+                          <a:pPr algn="ctr"/>
+                          <a:r>
+                            <a:rPr lang="en-CA" sz="2000" dirty="0"/>
+                            <a:t>LASSO</a:t>
+                          </a:r>
+                        </a:p>
+                      </a:txBody>
+                      <a:tcPr/>
+                    </a:tc>
+                    <a:tc>
+                      <a:txBody>
+                        <a:bodyPr/>
+                        <a:lstStyle/>
+                        <a:p>
+                          <a:pPr algn="ctr"/>
+                          <a:endParaRPr lang="en-CA" sz="2000"/>
+                        </a:p>
+                      </a:txBody>
+                      <a:tcPr/>
+                    </a:tc>
+                    <a:tc>
+                      <a:txBody>
+                        <a:bodyPr/>
+                        <a:lstStyle/>
+                        <a:p>
+                          <a:pPr algn="ctr"/>
+                          <a:endParaRPr lang="en-CA" sz="2000"/>
+                        </a:p>
+                      </a:txBody>
+                      <a:tcPr/>
+                    </a:tc>
+                    <a:tc>
+                      <a:txBody>
+                        <a:bodyPr/>
+                        <a:lstStyle/>
+                        <a:p>
+                          <a:pPr algn="ctr"/>
+                          <a:endParaRPr lang="en-CA" sz="2000"/>
+                        </a:p>
+                      </a:txBody>
+                      <a:tcPr/>
+                    </a:tc>
+                    <a:tc>
+                      <a:txBody>
+                        <a:bodyPr/>
+                        <a:lstStyle/>
+                        <a:p>
+                          <a:pPr algn="ctr"/>
+                          <a:endParaRPr lang="en-CA" sz="2000" dirty="0"/>
+                        </a:p>
+                      </a:txBody>
+                      <a:tcPr/>
+                    </a:tc>
+                    <a:tc>
+                      <a:txBody>
+                        <a:bodyPr/>
+                        <a:lstStyle/>
+                        <a:p>
+                          <a:pPr algn="ctr"/>
+                          <a:endParaRPr lang="en-CA" sz="2000" dirty="0"/>
+                        </a:p>
+                      </a:txBody>
+                      <a:tcPr/>
+                    </a:tc>
+                    <a:tc>
+                      <a:txBody>
+                        <a:bodyPr/>
+                        <a:lstStyle/>
+                        <a:p>
+                          <a:pPr algn="ctr"/>
+                          <a:endParaRPr lang="en-CA" sz="2000" dirty="0"/>
+                        </a:p>
+                      </a:txBody>
+                      <a:tcPr/>
+                    </a:tc>
+                    <a:extLst>
+                      <a:ext uri="{0D108BD9-81ED-4DB2-BD59-A6C34878D82A}">
+                        <a16:rowId xmlns:a16="http://schemas.microsoft.com/office/drawing/2014/main" val="3108683704"/>
+                      </a:ext>
+                    </a:extLst>
+                  </a:tr>
+                </a:tbl>
+              </a:graphicData>
+            </a:graphic>
+          </p:graphicFrame>
+        </mc:Fallback>
+      </mc:AlternateContent>
+      <mc:AlternateContent xmlns:mc="http://schemas.openxmlformats.org/markup-compatibility/2006">
+        <mc:Choice xmlns:a14="http://schemas.microsoft.com/office/drawing/2010/main" Requires="a14">
+          <p:graphicFrame>
+            <p:nvGraphicFramePr>
+              <p:cNvPr id="6" name="Table 4">
+                <a:extLst>
+                  <a:ext uri="{FF2B5EF4-FFF2-40B4-BE49-F238E27FC236}">
+                    <a16:creationId xmlns:a16="http://schemas.microsoft.com/office/drawing/2014/main" id="{EC9A1A88-7117-459C-844B-96A8C127E17D}"/>
+                  </a:ext>
+                </a:extLst>
+              </p:cNvPr>
+              <p:cNvGraphicFramePr>
+                <a:graphicFrameLocks noGrp="1"/>
+              </p:cNvGraphicFramePr>
+              <p:nvPr>
+                <p:extLst>
+                  <p:ext uri="{D42A27DB-BD31-4B8C-83A1-F6EECF244321}">
+                    <p14:modId xmlns:p14="http://schemas.microsoft.com/office/powerpoint/2010/main" val="368546746"/>
+                  </p:ext>
+                </p:extLst>
+              </p:nvPr>
+            </p:nvGraphicFramePr>
+            <p:xfrm>
+              <a:off x="1615089" y="4001294"/>
+              <a:ext cx="8961822" cy="1771206"/>
+            </p:xfrm>
+            <a:graphic>
+              <a:graphicData uri="http://schemas.openxmlformats.org/drawingml/2006/table">
+                <a:tbl>
+                  <a:tblPr>
+                    <a:tableStyleId>{073A0DAA-6AF3-43AB-8588-CEC1D06C72B9}</a:tableStyleId>
+                  </a:tblPr>
+                  <a:tblGrid>
+                    <a:gridCol w="4480911">
+                      <a:extLst>
+                        <a:ext uri="{9D8B030D-6E8A-4147-A177-3AD203B41FA5}">
+                          <a16:colId xmlns:a16="http://schemas.microsoft.com/office/drawing/2014/main" val="705846906"/>
+                        </a:ext>
+                      </a:extLst>
+                    </a:gridCol>
+                    <a:gridCol w="4480911">
+                      <a:extLst>
+                        <a:ext uri="{9D8B030D-6E8A-4147-A177-3AD203B41FA5}">
+                          <a16:colId xmlns:a16="http://schemas.microsoft.com/office/drawing/2014/main" val="1624902210"/>
+                        </a:ext>
+                      </a:extLst>
+                    </a:gridCol>
+                  </a:tblGrid>
+                  <a:tr h="370840">
+                    <a:tc>
+                      <a:txBody>
+                        <a:bodyPr/>
+                        <a:lstStyle/>
+                        <a:p>
+                          <a:pPr marL="457200" indent="-457200" algn="ctr">
+                            <a:buFont typeface="Arial" panose="020B0604020202020204" pitchFamily="34" charset="0"/>
+                            <a:buChar char="•"/>
+                          </a:pPr>
+                          <a14:m>
+                            <m:oMath xmlns:m="http://schemas.openxmlformats.org/officeDocument/2006/math">
+                              <m:r>
+                                <a:rPr lang="en-CA" sz="3200" smtClean="0"/>
+                                <m:t>𝑍</m:t>
+                              </m:r>
+                              <m:r>
+                                <a:rPr lang="en-CA" sz="3200" smtClean="0"/>
+                                <m:t>=</m:t>
+                              </m:r>
+                              <m:r>
+                                <m:rPr>
+                                  <m:sty m:val="p"/>
+                                </m:rPr>
+                                <a:rPr lang="en-CA" sz="3200" smtClean="0"/>
+                                <m:t>X</m:t>
+                              </m:r>
+                              <m:r>
+                                <a:rPr lang="en-CA" sz="3200" smtClean="0"/>
+                                <m:t>𝛽</m:t>
+                              </m:r>
+                              <m:r>
+                                <a:rPr lang="en-CA" sz="3200" smtClean="0"/>
+                                <m:t>+</m:t>
+                              </m:r>
+                              <m:r>
+                                <a:rPr lang="en-CA" sz="3200" smtClean="0"/>
+                                <m:t>𝜎𝜀</m:t>
+                              </m:r>
+                            </m:oMath>
+                          </a14:m>
+                          <a:endParaRPr lang="en-CA" sz="3200" dirty="0"/>
+                        </a:p>
+                      </a:txBody>
+                      <a:tcPr/>
+                    </a:tc>
+                    <a:tc>
+                      <a:txBody>
+                        <a:bodyPr/>
+                        <a:lstStyle/>
+                        <a:p>
+                          <a:pPr marL="457200" marR="0" lvl="0" indent="-457200" algn="ctr" defTabSz="914400" rtl="0" eaLnBrk="1" fontAlgn="auto" latinLnBrk="0" hangingPunct="1">
+                            <a:lnSpc>
+                              <a:spcPct val="100000"/>
+                            </a:lnSpc>
+                            <a:spcBef>
+                              <a:spcPts val="0"/>
+                            </a:spcBef>
+                            <a:spcAft>
+                              <a:spcPts val="0"/>
+                            </a:spcAft>
+                            <a:buClrTx/>
+                            <a:buSzTx/>
+                            <a:buFont typeface="Arial" panose="020B0604020202020204" pitchFamily="34" charset="0"/>
+                            <a:buChar char="•"/>
+                            <a:tabLst/>
+                            <a:defRPr/>
+                          </a:pPr>
+                          <a14:m>
+                            <m:oMath xmlns:m="http://schemas.openxmlformats.org/officeDocument/2006/math">
+                              <m:r>
+                                <a:rPr lang="en-CA" sz="3200" smtClean="0"/>
+                                <m:t>𝑛</m:t>
+                              </m:r>
+                              <m:r>
+                                <a:rPr lang="en-CA" sz="3200" smtClean="0"/>
+                                <m:t>=100</m:t>
+                              </m:r>
+                            </m:oMath>
+                          </a14:m>
+                          <a:endParaRPr lang="en-CA" sz="3200" dirty="0"/>
+                        </a:p>
+                      </a:txBody>
+                      <a:tcPr/>
+                    </a:tc>
+                    <a:extLst>
+                      <a:ext uri="{0D108BD9-81ED-4DB2-BD59-A6C34878D82A}">
+                        <a16:rowId xmlns:a16="http://schemas.microsoft.com/office/drawing/2014/main" val="13183627"/>
+                      </a:ext>
+                    </a:extLst>
+                  </a:tr>
+                  <a:tr h="370840">
+                    <a:tc>
+                      <a:txBody>
+                        <a:bodyPr/>
+                        <a:lstStyle/>
+                        <a:p>
+                          <a:pPr marL="457200" indent="-457200" algn="ctr">
+                            <a:buFont typeface="Arial" panose="020B0604020202020204" pitchFamily="34" charset="0"/>
+                            <a:buChar char="•"/>
+                          </a:pPr>
+                          <a14:m>
+                            <m:oMath xmlns:m="http://schemas.openxmlformats.org/officeDocument/2006/math">
+                              <m:r>
+                                <a:rPr lang="en-CA" sz="3200" smtClean="0"/>
+                                <m:t>𝜀</m:t>
+                              </m:r>
+                            </m:oMath>
+                          </a14:m>
+                          <a:r>
+                            <a:rPr lang="en-CA" sz="3200" dirty="0"/>
+                            <a:t> standard normal</a:t>
+                          </a:r>
+                        </a:p>
+                      </a:txBody>
+                      <a:tcPr/>
+                    </a:tc>
+                    <a:tc>
+                      <a:txBody>
+                        <a:bodyPr/>
+                        <a:lstStyle/>
+                        <a:p>
+                          <a:pPr marL="457200" indent="-457200" algn="ctr">
+                            <a:buFont typeface="Arial" panose="020B0604020202020204" pitchFamily="34" charset="0"/>
+                            <a:buChar char="•"/>
+                          </a:pPr>
+                          <a14:m>
+                            <m:oMath xmlns:m="http://schemas.openxmlformats.org/officeDocument/2006/math">
+                              <m:r>
+                                <a:rPr lang="en-CA" sz="3200" smtClean="0"/>
+                                <m:t>𝑌</m:t>
+                              </m:r>
+                              <m:r>
+                                <a:rPr lang="en-CA" sz="3200" smtClean="0"/>
+                                <m:t>=</m:t>
+                              </m:r>
+                              <m:sSubSup>
+                                <m:sSubSupPr>
+                                  <m:ctrlPr>
+                                    <a:rPr lang="en-CA" sz="3200" smtClean="0"/>
+                                  </m:ctrlPr>
+                                </m:sSubSupPr>
+                                <m:e>
+                                  <m:r>
+                                    <a:rPr lang="en-CA" sz="3200" smtClean="0"/>
+                                    <m:t>h</m:t>
+                                  </m:r>
+                                </m:e>
+                                <m:sub>
+                                  <m:r>
+                                    <a:rPr lang="en-CA" sz="3200" smtClean="0"/>
+                                    <m:t>0</m:t>
+                                  </m:r>
+                                </m:sub>
+                                <m:sup>
+                                  <m:r>
+                                    <a:rPr lang="en-CA" sz="3200" smtClean="0"/>
+                                    <m:t>−1</m:t>
+                                  </m:r>
+                                </m:sup>
+                              </m:sSubSup>
+                              <m:d>
+                                <m:dPr>
+                                  <m:ctrlPr>
+                                    <a:rPr lang="en-CA" sz="3200" smtClean="0"/>
+                                  </m:ctrlPr>
+                                </m:dPr>
+                                <m:e>
+                                  <m:r>
+                                    <a:rPr lang="en-CA" sz="3200" smtClean="0"/>
+                                    <m:t>𝑍</m:t>
+                                  </m:r>
+                                </m:e>
+                              </m:d>
+                              <m:r>
+                                <a:rPr lang="en-CA" sz="3200" smtClean="0"/>
+                                <m:t>=</m:t>
+                              </m:r>
+                              <m:func>
+                                <m:funcPr>
+                                  <m:ctrlPr>
+                                    <a:rPr lang="en-CA" sz="3200" smtClean="0"/>
+                                  </m:ctrlPr>
+                                </m:funcPr>
+                                <m:fName>
+                                  <m:r>
+                                    <m:rPr>
+                                      <m:sty m:val="p"/>
+                                    </m:rPr>
+                                    <a:rPr lang="en-CA" sz="3200" smtClean="0"/>
+                                    <m:t>exp</m:t>
+                                  </m:r>
+                                </m:fName>
+                                <m:e>
+                                  <m:d>
+                                    <m:dPr>
+                                      <m:ctrlPr>
+                                        <a:rPr lang="en-CA" sz="3200" smtClean="0"/>
+                                      </m:ctrlPr>
+                                    </m:dPr>
+                                    <m:e>
+                                      <m:r>
+                                        <a:rPr lang="en-CA" sz="3200" smtClean="0"/>
+                                        <m:t>𝑍</m:t>
+                                      </m:r>
+                                    </m:e>
+                                  </m:d>
+                                </m:e>
+                              </m:func>
+                            </m:oMath>
+                          </a14:m>
+                          <a:endParaRPr lang="en-CA" sz="3200" dirty="0"/>
+                        </a:p>
+                      </a:txBody>
+                      <a:tcPr/>
+                    </a:tc>
+                    <a:extLst>
+                      <a:ext uri="{0D108BD9-81ED-4DB2-BD59-A6C34878D82A}">
+                        <a16:rowId xmlns:a16="http://schemas.microsoft.com/office/drawing/2014/main" val="1894105132"/>
+                      </a:ext>
+                    </a:extLst>
+                  </a:tr>
+                  <a:tr h="370840">
+                    <a:tc>
+                      <a:txBody>
+                        <a:bodyPr/>
+                        <a:lstStyle/>
+                        <a:p>
+                          <a:pPr marL="457200" indent="-457200" algn="ctr">
+                            <a:buFont typeface="Arial" panose="020B0604020202020204" pitchFamily="34" charset="0"/>
+                            <a:buChar char="•"/>
+                          </a:pPr>
+                          <a14:m>
+                            <m:oMath xmlns:m="http://schemas.openxmlformats.org/officeDocument/2006/math">
+                              <m:r>
+                                <a:rPr lang="en-CA" sz="3200" smtClean="0"/>
+                                <m:t>𝛽</m:t>
+                              </m:r>
+                            </m:oMath>
+                          </a14:m>
+                          <a:r>
+                            <a:rPr lang="en-CA" sz="3200" dirty="0"/>
+                            <a:t> square-root sparse</a:t>
+                          </a:r>
+                        </a:p>
+                      </a:txBody>
+                      <a:tcPr/>
+                    </a:tc>
+                    <a:tc>
+                      <a:txBody>
+                        <a:bodyPr/>
+                        <a:lstStyle/>
+                        <a:p>
+                          <a:pPr marL="457200" indent="-457200" algn="ctr">
+                            <a:buFont typeface="Arial" panose="020B0604020202020204" pitchFamily="34" charset="0"/>
+                            <a:buChar char="•"/>
+                          </a:pPr>
+                          <a:endParaRPr lang="en-CA" sz="3200" dirty="0"/>
+                        </a:p>
+                      </a:txBody>
+                      <a:tcPr/>
+                    </a:tc>
+                    <a:extLst>
+                      <a:ext uri="{0D108BD9-81ED-4DB2-BD59-A6C34878D82A}">
+                        <a16:rowId xmlns:a16="http://schemas.microsoft.com/office/drawing/2014/main" val="1653310339"/>
+                      </a:ext>
+                    </a:extLst>
+                  </a:tr>
+                </a:tbl>
+              </a:graphicData>
+            </a:graphic>
+          </p:graphicFrame>
+        </mc:Choice>
+        <mc:Fallback>
+          <p:graphicFrame>
+            <p:nvGraphicFramePr>
+              <p:cNvPr id="6" name="Table 4">
+                <a:extLst>
+                  <a:ext uri="{FF2B5EF4-FFF2-40B4-BE49-F238E27FC236}">
+                    <a16:creationId xmlns:a16="http://schemas.microsoft.com/office/drawing/2014/main" id="{EC9A1A88-7117-459C-844B-96A8C127E17D}"/>
+                  </a:ext>
+                </a:extLst>
+              </p:cNvPr>
+              <p:cNvGraphicFramePr>
+                <a:graphicFrameLocks noGrp="1"/>
+              </p:cNvGraphicFramePr>
+              <p:nvPr>
+                <p:extLst>
+                  <p:ext uri="{D42A27DB-BD31-4B8C-83A1-F6EECF244321}">
+                    <p14:modId xmlns:p14="http://schemas.microsoft.com/office/powerpoint/2010/main" val="368546746"/>
+                  </p:ext>
+                </p:extLst>
+              </p:nvPr>
+            </p:nvGraphicFramePr>
+            <p:xfrm>
+              <a:off x="1615089" y="4001294"/>
+              <a:ext cx="8961822" cy="1771206"/>
+            </p:xfrm>
+            <a:graphic>
+              <a:graphicData uri="http://schemas.openxmlformats.org/drawingml/2006/table">
+                <a:tbl>
+                  <a:tblPr>
+                    <a:tableStyleId>{073A0DAA-6AF3-43AB-8588-CEC1D06C72B9}</a:tableStyleId>
+                  </a:tblPr>
+                  <a:tblGrid>
+                    <a:gridCol w="4480911">
+                      <a:extLst>
+                        <a:ext uri="{9D8B030D-6E8A-4147-A177-3AD203B41FA5}">
+                          <a16:colId xmlns:a16="http://schemas.microsoft.com/office/drawing/2014/main" val="705846906"/>
+                        </a:ext>
+                      </a:extLst>
+                    </a:gridCol>
+                    <a:gridCol w="4480911">
+                      <a:extLst>
+                        <a:ext uri="{9D8B030D-6E8A-4147-A177-3AD203B41FA5}">
+                          <a16:colId xmlns:a16="http://schemas.microsoft.com/office/drawing/2014/main" val="1624902210"/>
+                        </a:ext>
+                      </a:extLst>
+                    </a:gridCol>
+                  </a:tblGrid>
+                  <a:tr h="579120">
+                    <a:tc>
+                      <a:txBody>
+                        <a:bodyPr/>
+                        <a:lstStyle/>
+                        <a:p>
+                          <a:endParaRPr lang="en-US"/>
+                        </a:p>
+                      </a:txBody>
+                      <a:tcPr>
+                        <a:blipFill>
+                          <a:blip r:embed="rId3"/>
+                          <a:stretch>
+                            <a:fillRect l="-136" t="-1053" r="-100272" b="-242105"/>
+                          </a:stretch>
+                        </a:blipFill>
+                      </a:tcPr>
+                    </a:tc>
+                    <a:tc>
+                      <a:txBody>
+                        <a:bodyPr/>
+                        <a:lstStyle/>
+                        <a:p>
+                          <a:endParaRPr lang="en-US"/>
+                        </a:p>
+                      </a:txBody>
+                      <a:tcPr>
+                        <a:blipFill>
+                          <a:blip r:embed="rId3"/>
+                          <a:stretch>
+                            <a:fillRect l="-100136" t="-1053" r="-272" b="-242105"/>
+                          </a:stretch>
+                        </a:blipFill>
+                      </a:tcPr>
+                    </a:tc>
+                    <a:extLst>
+                      <a:ext uri="{0D108BD9-81ED-4DB2-BD59-A6C34878D82A}">
+                        <a16:rowId xmlns:a16="http://schemas.microsoft.com/office/drawing/2014/main" val="13183627"/>
+                      </a:ext>
+                    </a:extLst>
+                  </a:tr>
+                  <a:tr h="612966">
+                    <a:tc>
+                      <a:txBody>
+                        <a:bodyPr/>
+                        <a:lstStyle/>
+                        <a:p>
+                          <a:endParaRPr lang="en-US"/>
+                        </a:p>
+                      </a:txBody>
+                      <a:tcPr>
+                        <a:blipFill>
+                          <a:blip r:embed="rId3"/>
+                          <a:stretch>
+                            <a:fillRect l="-136" t="-95050" r="-100272" b="-127723"/>
+                          </a:stretch>
+                        </a:blipFill>
+                      </a:tcPr>
+                    </a:tc>
+                    <a:tc>
+                      <a:txBody>
+                        <a:bodyPr/>
+                        <a:lstStyle/>
+                        <a:p>
+                          <a:endParaRPr lang="en-US"/>
+                        </a:p>
+                      </a:txBody>
+                      <a:tcPr>
+                        <a:blipFill>
+                          <a:blip r:embed="rId3"/>
+                          <a:stretch>
+                            <a:fillRect l="-100136" t="-95050" r="-272" b="-127723"/>
+                          </a:stretch>
+                        </a:blipFill>
+                      </a:tcPr>
+                    </a:tc>
+                    <a:extLst>
+                      <a:ext uri="{0D108BD9-81ED-4DB2-BD59-A6C34878D82A}">
+                        <a16:rowId xmlns:a16="http://schemas.microsoft.com/office/drawing/2014/main" val="1894105132"/>
+                      </a:ext>
+                    </a:extLst>
+                  </a:tr>
+                  <a:tr h="579120">
+                    <a:tc>
+                      <a:txBody>
+                        <a:bodyPr/>
+                        <a:lstStyle/>
+                        <a:p>
+                          <a:endParaRPr lang="en-US"/>
+                        </a:p>
+                      </a:txBody>
+                      <a:tcPr>
+                        <a:blipFill>
+                          <a:blip r:embed="rId3"/>
+                          <a:stretch>
+                            <a:fillRect l="-136" t="-207368" r="-100272" b="-35789"/>
+                          </a:stretch>
+                        </a:blipFill>
+                      </a:tcPr>
+                    </a:tc>
+                    <a:tc>
+                      <a:txBody>
+                        <a:bodyPr/>
+                        <a:lstStyle/>
+                        <a:p>
+                          <a:pPr marL="457200" indent="-457200" algn="ctr">
+                            <a:buFont typeface="Arial" panose="020B0604020202020204" pitchFamily="34" charset="0"/>
+                            <a:buChar char="•"/>
+                          </a:pPr>
+                          <a:endParaRPr lang="en-CA" sz="3200" dirty="0"/>
+                        </a:p>
+                      </a:txBody>
+                      <a:tcPr/>
+                    </a:tc>
+                    <a:extLst>
+                      <a:ext uri="{0D108BD9-81ED-4DB2-BD59-A6C34878D82A}">
+                        <a16:rowId xmlns:a16="http://schemas.microsoft.com/office/drawing/2014/main" val="1653310339"/>
+                      </a:ext>
+                    </a:extLst>
+                  </a:tr>
+                </a:tbl>
+              </a:graphicData>
+            </a:graphic>
+          </p:graphicFrame>
+        </mc:Fallback>
+      </mc:AlternateContent>
+    </p:spTree>
+    <p:extLst>
+      <p:ext uri="{BB962C8B-B14F-4D97-AF65-F5344CB8AC3E}">
+        <p14:creationId xmlns:p14="http://schemas.microsoft.com/office/powerpoint/2010/main" val="990426515"/>
+      </p:ext>
+    </p:extLst>
+  </p:cSld>
+  <p:clrMapOvr>
+    <a:masterClrMapping/>
+  </p:clrMapOvr>
+</p:sld>
+</file>
+
 <file path=ppt/slides/slide3.xml><?xml version="1.0" encoding="utf-8"?>
 <p:sld xmlns:a="http://schemas.openxmlformats.org/drawingml/2006/main" xmlns:r="http://schemas.openxmlformats.org/officeDocument/2006/relationships" xmlns:p="http://schemas.openxmlformats.org/presentationml/2006/main">
   <p:cSld>
@@ -6811,8 +9825,8 @@
           </a:p>
         </p:txBody>
       </p:sp>
-      <mc:AlternateContent xmlns:mc="http://schemas.openxmlformats.org/markup-compatibility/2006">
-        <mc:Choice xmlns:a14="http://schemas.microsoft.com/office/drawing/2010/main" Requires="a14">
+      <mc:AlternateContent xmlns:mc="http://schemas.openxmlformats.org/markup-compatibility/2006" xmlns:a14="http://schemas.microsoft.com/office/drawing/2010/main">
+        <mc:Choice Requires="a14">
           <p:sp>
             <p:nvSpPr>
               <p:cNvPr id="3" name="Content Placeholder 2">
@@ -6884,7 +9898,7 @@
             </p:txBody>
           </p:sp>
         </mc:Choice>
-        <mc:Fallback>
+        <mc:Fallback xmlns="">
           <p:sp>
             <p:nvSpPr>
               <p:cNvPr id="3" name="Content Placeholder 2">
@@ -6982,8 +9996,8 @@
           </a:p>
         </p:txBody>
       </p:sp>
-      <mc:AlternateContent xmlns:mc="http://schemas.openxmlformats.org/markup-compatibility/2006" xmlns:a14="http://schemas.microsoft.com/office/drawing/2010/main">
-        <mc:Choice Requires="a14">
+      <mc:AlternateContent xmlns:mc="http://schemas.openxmlformats.org/markup-compatibility/2006">
+        <mc:Choice xmlns:a14="http://schemas.microsoft.com/office/drawing/2010/main" Requires="a14">
           <p:sp>
             <p:nvSpPr>
               <p:cNvPr id="3" name="Content Placeholder 2">
@@ -7050,13 +10064,13 @@
                 <a:pPr lvl="1"/>
                 <a:r>
                   <a:rPr lang="en-CA" dirty="0"/>
-                  <a:t>Confidence interval for Box-Cox transformation parameter</a:t>
+                  <a:t>“Confidence interval” for Box-Cox transformation parameter</a:t>
                 </a:r>
               </a:p>
             </p:txBody>
           </p:sp>
         </mc:Choice>
-        <mc:Fallback xmlns="">
+        <mc:Fallback>
           <p:sp>
             <p:nvSpPr>
               <p:cNvPr id="3" name="Content Placeholder 2">
@@ -7193,7 +10207,7 @@
                 </a14:m>
                 <a:r>
                   <a:rPr lang="en-CA" dirty="0"/>
-                  <a:t> is between about </a:t>
+                  <a:t> is between </a:t>
                 </a:r>
                 <a14:m>
                   <m:oMath xmlns:m="http://schemas.openxmlformats.org/officeDocument/2006/math">
@@ -7201,13 +10215,7 @@
                       <a:rPr lang="en-CA" b="0" i="1" smtClean="0">
                         <a:latin typeface="Cambria Math" panose="02040503050406030204" pitchFamily="18" charset="0"/>
                       </a:rPr>
-                      <m:t>0.5</m:t>
-                    </m:r>
-                    <m:r>
-                      <a:rPr lang="en-CA" b="0" i="1" smtClean="0">
-                        <a:latin typeface="Cambria Math" panose="02040503050406030204" pitchFamily="18" charset="0"/>
-                      </a:rPr>
-                      <m:t>5</m:t>
+                      <m:t>0.55</m:t>
                     </m:r>
                   </m:oMath>
                 </a14:m>
@@ -7910,8 +10918,8 @@
           </a:p>
         </p:txBody>
       </p:sp>
-      <mc:AlternateContent xmlns:mc="http://schemas.openxmlformats.org/markup-compatibility/2006">
-        <mc:Choice xmlns:a14="http://schemas.microsoft.com/office/drawing/2010/main" Requires="a14">
+      <mc:AlternateContent xmlns:mc="http://schemas.openxmlformats.org/markup-compatibility/2006" xmlns:a14="http://schemas.microsoft.com/office/drawing/2010/main">
+        <mc:Choice Requires="a14">
           <p:sp>
             <p:nvSpPr>
               <p:cNvPr id="3" name="Content Placeholder 2">
@@ -8140,7 +11148,7 @@
             </p:txBody>
           </p:sp>
         </mc:Choice>
-        <mc:Fallback>
+        <mc:Fallback xmlns="">
           <p:sp>
             <p:nvSpPr>
               <p:cNvPr id="3" name="Content Placeholder 2">

</xml_diff>